<commit_message>
Just changed the logo position
</commit_message>
<xml_diff>
--- a/PPT Template/EnlightersAcademyTemplate.pptx
+++ b/PPT Template/EnlightersAcademyTemplate.pptx
@@ -5,12 +5,14 @@
     <p:sldMasterId id="2147483658" r:id="rId1"/>
   </p:sldMasterIdLst>
   <p:notesMasterIdLst>
-    <p:notesMasterId r:id="rId5"/>
+    <p:notesMasterId r:id="rId4"/>
   </p:notesMasterIdLst>
+  <p:handoutMasterIdLst>
+    <p:handoutMasterId r:id="rId5"/>
+  </p:handoutMasterIdLst>
   <p:sldIdLst>
     <p:sldId id="256" r:id="rId2"/>
-    <p:sldId id="261" r:id="rId3"/>
-    <p:sldId id="262" r:id="rId4"/>
+    <p:sldId id="262" r:id="rId3"/>
   </p:sldIdLst>
   <p:sldSz cx="9144000" cy="5143500" type="screen16x9"/>
   <p:notesSz cx="6858000" cy="9144000"/>
@@ -220,8 +222,176 @@
     <p:ext uri="{EFAFB233-063F-42B5-8137-9DF3F51BA10A}">
       <p15:sldGuideLst xmlns:p15="http://schemas.microsoft.com/office/powerpoint/2012/main"/>
     </p:ext>
+    <p:ext uri="{2D200454-40CA-4A62-9FC3-DE9A4176ACB9}">
+      <p15:notesGuideLst xmlns:p15="http://schemas.microsoft.com/office/powerpoint/2012/main"/>
+    </p:ext>
   </p:extLst>
 </p:presentation>
+</file>
+
+<file path=ppt/handoutMasters/handoutMaster1.xml><?xml version="1.0" encoding="utf-8"?>
+<p:handoutMaster xmlns:a="http://schemas.openxmlformats.org/drawingml/2006/main" xmlns:r="http://schemas.openxmlformats.org/officeDocument/2006/relationships" xmlns:p="http://schemas.openxmlformats.org/presentationml/2006/main">
+  <p:cSld>
+    <p:bg>
+      <p:bgRef idx="1001">
+        <a:schemeClr val="bg1"/>
+      </p:bgRef>
+    </p:bg>
+    <p:spTree>
+      <p:nvGrpSpPr>
+        <p:cNvPr id="1" name=""/>
+        <p:cNvGrpSpPr/>
+        <p:nvPr/>
+      </p:nvGrpSpPr>
+      <p:grpSpPr>
+        <a:xfrm>
+          <a:off x="0" y="0"/>
+          <a:ext cx="0" cy="0"/>
+          <a:chOff x="0" y="0"/>
+          <a:chExt cx="0" cy="0"/>
+        </a:xfrm>
+      </p:grpSpPr>
+      <p:sp>
+        <p:nvSpPr>
+          <p:cNvPr id="2" name="Header Placeholder 1"/>
+          <p:cNvSpPr>
+            <a:spLocks noGrp="1"/>
+          </p:cNvSpPr>
+          <p:nvPr>
+            <p:ph type="hdr" sz="quarter"/>
+          </p:nvPr>
+        </p:nvSpPr>
+        <p:spPr>
+          <a:xfrm>
+            <a:off x="0" y="0"/>
+            <a:ext cx="2971800" cy="458788"/>
+          </a:xfrm>
+          <a:prstGeom prst="rect">
+            <a:avLst/>
+          </a:prstGeom>
+        </p:spPr>
+        <p:txBody>
+          <a:bodyPr vert="horz" lIns="91440" tIns="45720" rIns="91440" bIns="45720" rtlCol="0"/>
+          <a:lstStyle>
+            <a:lvl1pPr algn="l">
+              <a:defRPr sz="1200"/>
+            </a:lvl1pPr>
+          </a:lstStyle>
+          <a:p>
+            <a:endParaRPr lang="en-US"/>
+          </a:p>
+        </p:txBody>
+      </p:sp>
+      <p:sp>
+        <p:nvSpPr>
+          <p:cNvPr id="3" name="Date Placeholder 2"/>
+          <p:cNvSpPr>
+            <a:spLocks noGrp="1"/>
+          </p:cNvSpPr>
+          <p:nvPr>
+            <p:ph type="dt" sz="quarter" idx="1"/>
+          </p:nvPr>
+        </p:nvSpPr>
+        <p:spPr>
+          <a:xfrm>
+            <a:off x="3884613" y="0"/>
+            <a:ext cx="2971800" cy="458788"/>
+          </a:xfrm>
+          <a:prstGeom prst="rect">
+            <a:avLst/>
+          </a:prstGeom>
+        </p:spPr>
+        <p:txBody>
+          <a:bodyPr vert="horz" lIns="91440" tIns="45720" rIns="91440" bIns="45720" rtlCol="0"/>
+          <a:lstStyle>
+            <a:lvl1pPr algn="r">
+              <a:defRPr sz="1200"/>
+            </a:lvl1pPr>
+          </a:lstStyle>
+          <a:p>
+            <a:fld id="{A8FE50AF-CCEF-774A-8C55-9A0A6A9ED52E}" type="datetimeFigureOut">
+              <a:rPr lang="en-US" smtClean="0"/>
+              <a:t>11/2/17</a:t>
+            </a:fld>
+            <a:endParaRPr lang="en-US"/>
+          </a:p>
+        </p:txBody>
+      </p:sp>
+      <p:sp>
+        <p:nvSpPr>
+          <p:cNvPr id="4" name="Footer Placeholder 3"/>
+          <p:cNvSpPr>
+            <a:spLocks noGrp="1"/>
+          </p:cNvSpPr>
+          <p:nvPr>
+            <p:ph type="ftr" sz="quarter" idx="2"/>
+          </p:nvPr>
+        </p:nvSpPr>
+        <p:spPr>
+          <a:xfrm>
+            <a:off x="0" y="8685213"/>
+            <a:ext cx="2971800" cy="458787"/>
+          </a:xfrm>
+          <a:prstGeom prst="rect">
+            <a:avLst/>
+          </a:prstGeom>
+        </p:spPr>
+        <p:txBody>
+          <a:bodyPr vert="horz" lIns="91440" tIns="45720" rIns="91440" bIns="45720" rtlCol="0" anchor="b"/>
+          <a:lstStyle>
+            <a:lvl1pPr algn="l">
+              <a:defRPr sz="1200"/>
+            </a:lvl1pPr>
+          </a:lstStyle>
+          <a:p>
+            <a:endParaRPr lang="en-US"/>
+          </a:p>
+        </p:txBody>
+      </p:sp>
+      <p:sp>
+        <p:nvSpPr>
+          <p:cNvPr id="5" name="Slide Number Placeholder 4"/>
+          <p:cNvSpPr>
+            <a:spLocks noGrp="1"/>
+          </p:cNvSpPr>
+          <p:nvPr>
+            <p:ph type="sldNum" sz="quarter" idx="3"/>
+          </p:nvPr>
+        </p:nvSpPr>
+        <p:spPr>
+          <a:xfrm>
+            <a:off x="3884613" y="8685213"/>
+            <a:ext cx="2971800" cy="458787"/>
+          </a:xfrm>
+          <a:prstGeom prst="rect">
+            <a:avLst/>
+          </a:prstGeom>
+        </p:spPr>
+        <p:txBody>
+          <a:bodyPr vert="horz" lIns="91440" tIns="45720" rIns="91440" bIns="45720" rtlCol="0" anchor="b"/>
+          <a:lstStyle>
+            <a:lvl1pPr algn="r">
+              <a:defRPr sz="1200"/>
+            </a:lvl1pPr>
+          </a:lstStyle>
+          <a:p>
+            <a:fld id="{730DAF60-6B91-EC4A-8141-60BA7D8AB7D4}" type="slidenum">
+              <a:rPr lang="en-US" smtClean="0"/>
+              <a:t>‹#›</a:t>
+            </a:fld>
+            <a:endParaRPr lang="en-US"/>
+          </a:p>
+        </p:txBody>
+      </p:sp>
+    </p:spTree>
+    <p:extLst>
+      <p:ext uri="{BB962C8B-B14F-4D97-AF65-F5344CB8AC3E}">
+        <p14:creationId xmlns:p14="http://schemas.microsoft.com/office/powerpoint/2010/main" val="1839747245"/>
+      </p:ext>
+    </p:extLst>
+  </p:cSld>
+  <p:clrMap bg1="lt1" tx1="dk1" bg2="lt2" tx2="dk2" accent1="accent1" accent2="accent2" accent3="accent3" accent4="accent4" accent5="accent5" accent6="accent6" hlink="hlink" folHlink="folHlink"/>
+</p:handoutMaster>
 </file>
 
 <file path=ppt/notesMasters/notesMaster1.xml><?xml version="1.0" encoding="utf-8"?>
@@ -388,7 +558,7 @@
             </a:lvl9pPr>
           </a:lstStyle>
           <a:p>
-            <a:endParaRPr/>
+            <a:endParaRPr dirty="0"/>
           </a:p>
         </p:txBody>
       </p:sp>
@@ -601,114 +771,8 @@
 </p:notes>
 </file>
 
-<file path=ppt/notesSlides/notesSlide2.xml><?xml version="1.0" encoding="utf-8"?>
-<p:notes xmlns:a="http://schemas.openxmlformats.org/drawingml/2006/main" xmlns:r="http://schemas.openxmlformats.org/officeDocument/2006/relationships" xmlns:p="http://schemas.openxmlformats.org/presentationml/2006/main" showMasterSp="0" showMasterPhAnim="0">
-  <p:cSld>
-    <p:spTree>
-      <p:nvGrpSpPr>
-        <p:cNvPr id="1" name="Shape 106"/>
-        <p:cNvGrpSpPr/>
-        <p:nvPr/>
-      </p:nvGrpSpPr>
-      <p:grpSpPr>
-        <a:xfrm>
-          <a:off x="0" y="0"/>
-          <a:ext cx="0" cy="0"/>
-          <a:chOff x="0" y="0"/>
-          <a:chExt cx="0" cy="0"/>
-        </a:xfrm>
-      </p:grpSpPr>
-      <p:sp>
-        <p:nvSpPr>
-          <p:cNvPr id="107" name="Shape 107"/>
-          <p:cNvSpPr>
-            <a:spLocks noGrp="1" noRot="1" noChangeAspect="1"/>
-          </p:cNvSpPr>
-          <p:nvPr>
-            <p:ph type="sldImg" idx="2"/>
-          </p:nvPr>
-        </p:nvSpPr>
-        <p:spPr>
-          <a:xfrm>
-            <a:off x="381000" y="685800"/>
-            <a:ext cx="6096000" cy="3429000"/>
-          </a:xfrm>
-          <a:custGeom>
-            <a:avLst/>
-            <a:gdLst/>
-            <a:ahLst/>
-            <a:cxnLst/>
-            <a:rect l="0" t="0" r="0" b="0"/>
-            <a:pathLst>
-              <a:path w="120000" h="120000" extrusionOk="0">
-                <a:moveTo>
-                  <a:pt x="0" y="0"/>
-                </a:moveTo>
-                <a:lnTo>
-                  <a:pt x="120000" y="0"/>
-                </a:lnTo>
-                <a:lnTo>
-                  <a:pt x="120000" y="120000"/>
-                </a:lnTo>
-                <a:lnTo>
-                  <a:pt x="0" y="120000"/>
-                </a:lnTo>
-                <a:close/>
-              </a:path>
-            </a:pathLst>
-          </a:custGeom>
-        </p:spPr>
-      </p:sp>
-      <p:sp>
-        <p:nvSpPr>
-          <p:cNvPr id="108" name="Shape 108"/>
-          <p:cNvSpPr txBox="1">
-            <a:spLocks noGrp="1"/>
-          </p:cNvSpPr>
-          <p:nvPr>
-            <p:ph type="body" idx="1"/>
-          </p:nvPr>
-        </p:nvSpPr>
-        <p:spPr>
-          <a:xfrm>
-            <a:off x="685800" y="4343400"/>
-            <a:ext cx="5486400" cy="4114800"/>
-          </a:xfrm>
-          <a:prstGeom prst="rect">
-            <a:avLst/>
-          </a:prstGeom>
-        </p:spPr>
-        <p:txBody>
-          <a:bodyPr wrap="square" lIns="91425" tIns="91425" rIns="91425" bIns="91425" anchor="t" anchorCtr="0">
-            <a:noAutofit/>
-          </a:bodyPr>
-          <a:lstStyle/>
-          <a:p>
-            <a:pPr lvl="0">
-              <a:spcBef>
-                <a:spcPts val="0"/>
-              </a:spcBef>
-              <a:buNone/>
-            </a:pPr>
-            <a:endParaRPr/>
-          </a:p>
-        </p:txBody>
-      </p:sp>
-    </p:spTree>
-    <p:extLst>
-      <p:ext uri="{BB962C8B-B14F-4D97-AF65-F5344CB8AC3E}">
-        <p14:creationId xmlns:p14="http://schemas.microsoft.com/office/powerpoint/2010/main" val="892761871"/>
-      </p:ext>
-    </p:extLst>
-  </p:cSld>
-  <p:clrMapOvr>
-    <a:masterClrMapping/>
-  </p:clrMapOvr>
-</p:notes>
-</file>
-
 <file path=ppt/slideLayouts/slideLayout1.xml><?xml version="1.0" encoding="utf-8"?>
-<p:sldLayout xmlns:a="http://schemas.openxmlformats.org/drawingml/2006/main" xmlns:r="http://schemas.openxmlformats.org/officeDocument/2006/relationships" xmlns:p="http://schemas.openxmlformats.org/presentationml/2006/main" type="title">
+<p:sldLayout xmlns:a="http://schemas.openxmlformats.org/drawingml/2006/main" xmlns:r="http://schemas.openxmlformats.org/officeDocument/2006/relationships" xmlns:p="http://schemas.openxmlformats.org/presentationml/2006/main" userDrawn="1">
   <p:cSld name="Title">
     <p:spTree>
       <p:nvGrpSpPr>
@@ -724,97 +788,6 @@
           <a:chExt cx="0" cy="0"/>
         </a:xfrm>
       </p:grpSpPr>
-      <p:sp>
-        <p:nvSpPr>
-          <p:cNvPr id="9" name="Shape 9"/>
-          <p:cNvSpPr txBox="1">
-            <a:spLocks noGrp="1"/>
-          </p:cNvSpPr>
-          <p:nvPr>
-            <p:ph type="ctrTitle"/>
-          </p:nvPr>
-        </p:nvSpPr>
-        <p:spPr>
-          <a:xfrm>
-            <a:off x="996630" y="2003888"/>
-            <a:ext cx="4523700" cy="1159800"/>
-          </a:xfrm>
-          <a:prstGeom prst="rect">
-            <a:avLst/>
-          </a:prstGeom>
-        </p:spPr>
-        <p:txBody>
-          <a:bodyPr wrap="square" lIns="91425" tIns="91425" rIns="91425" bIns="91425" anchor="b" anchorCtr="0"/>
-          <a:lstStyle>
-            <a:lvl1pPr lvl="0">
-              <a:spcBef>
-                <a:spcPts val="0"/>
-              </a:spcBef>
-              <a:buSzPct val="100000"/>
-              <a:defRPr sz="3600"/>
-            </a:lvl1pPr>
-            <a:lvl2pPr lvl="1">
-              <a:spcBef>
-                <a:spcPts val="0"/>
-              </a:spcBef>
-              <a:buSzPct val="100000"/>
-              <a:defRPr sz="3600"/>
-            </a:lvl2pPr>
-            <a:lvl3pPr lvl="2">
-              <a:spcBef>
-                <a:spcPts val="0"/>
-              </a:spcBef>
-              <a:buSzPct val="100000"/>
-              <a:defRPr sz="3600"/>
-            </a:lvl3pPr>
-            <a:lvl4pPr lvl="3">
-              <a:spcBef>
-                <a:spcPts val="0"/>
-              </a:spcBef>
-              <a:buSzPct val="100000"/>
-              <a:defRPr sz="3600"/>
-            </a:lvl4pPr>
-            <a:lvl5pPr lvl="4">
-              <a:spcBef>
-                <a:spcPts val="0"/>
-              </a:spcBef>
-              <a:buSzPct val="100000"/>
-              <a:defRPr sz="3600"/>
-            </a:lvl5pPr>
-            <a:lvl6pPr lvl="5">
-              <a:spcBef>
-                <a:spcPts val="0"/>
-              </a:spcBef>
-              <a:buSzPct val="100000"/>
-              <a:defRPr sz="3600"/>
-            </a:lvl6pPr>
-            <a:lvl7pPr lvl="6">
-              <a:spcBef>
-                <a:spcPts val="0"/>
-              </a:spcBef>
-              <a:buSzPct val="100000"/>
-              <a:defRPr sz="3600"/>
-            </a:lvl7pPr>
-            <a:lvl8pPr lvl="7">
-              <a:spcBef>
-                <a:spcPts val="0"/>
-              </a:spcBef>
-              <a:buSzPct val="100000"/>
-              <a:defRPr sz="3600"/>
-            </a:lvl8pPr>
-            <a:lvl9pPr lvl="8">
-              <a:spcBef>
-                <a:spcPts val="0"/>
-              </a:spcBef>
-              <a:buSzPct val="100000"/>
-              <a:defRPr sz="3600"/>
-            </a:lvl9pPr>
-          </a:lstStyle>
-          <a:p>
-            <a:endParaRPr/>
-          </a:p>
-        </p:txBody>
-      </p:sp>
       <p:cxnSp>
         <p:nvCxnSpPr>
           <p:cNvPr id="10" name="Shape 10"/>
@@ -823,7 +796,7 @@
         </p:nvCxnSpPr>
         <p:spPr>
           <a:xfrm>
-            <a:off x="-6025" y="3676512"/>
+            <a:off x="0" y="3640924"/>
             <a:ext cx="9162000" cy="0"/>
           </a:xfrm>
           <a:prstGeom prst="straightConnector1">
@@ -849,7 +822,7 @@
         </p:nvSpPr>
         <p:spPr>
           <a:xfrm>
-            <a:off x="1117950" y="3393000"/>
+            <a:off x="471181" y="3393000"/>
             <a:ext cx="567000" cy="567000"/>
           </a:xfrm>
           <a:prstGeom prst="ellipse">
@@ -886,11 +859,19 @@
         </p:nvGrpSpPr>
         <p:grpSpPr>
           <a:xfrm>
-            <a:off x="1299165" y="3511424"/>
+            <a:off x="641246" y="3511424"/>
             <a:ext cx="215966" cy="342399"/>
             <a:chOff x="6718575" y="2318625"/>
             <a:chExt cx="256950" cy="407375"/>
           </a:xfrm>
+          <a:effectLst>
+            <a:glow rad="139700">
+              <a:schemeClr val="accent2">
+                <a:satMod val="175000"/>
+                <a:alpha val="40000"/>
+              </a:schemeClr>
+            </a:glow>
+          </a:effectLst>
         </p:grpSpPr>
         <p:sp>
           <p:nvSpPr>
@@ -1654,7 +1635,45 @@
 </file>
 
 <file path=ppt/slideLayouts/slideLayout2.xml><?xml version="1.0" encoding="utf-8"?>
-<p:sldLayout xmlns:a="http://schemas.openxmlformats.org/drawingml/2006/main" xmlns:r="http://schemas.openxmlformats.org/officeDocument/2006/relationships" xmlns:p="http://schemas.openxmlformats.org/presentationml/2006/main" type="tx">
+<p:sldLayout xmlns:a="http://schemas.openxmlformats.org/drawingml/2006/main" xmlns:r="http://schemas.openxmlformats.org/officeDocument/2006/relationships" xmlns:p="http://schemas.openxmlformats.org/presentationml/2006/main" preserve="1" userDrawn="1">
+  <p:cSld name="Custom Layout">
+    <p:bg>
+      <p:bgRef idx="1001">
+        <a:schemeClr val="bg1"/>
+      </p:bgRef>
+    </p:bg>
+    <p:spTree>
+      <p:nvGrpSpPr>
+        <p:cNvPr id="1" name=""/>
+        <p:cNvGrpSpPr/>
+        <p:nvPr/>
+      </p:nvGrpSpPr>
+      <p:grpSpPr>
+        <a:xfrm>
+          <a:off x="0" y="0"/>
+          <a:ext cx="0" cy="0"/>
+          <a:chOff x="0" y="0"/>
+          <a:chExt cx="0" cy="0"/>
+        </a:xfrm>
+      </p:grpSpPr>
+    </p:spTree>
+    <p:extLst>
+      <p:ext uri="{BB962C8B-B14F-4D97-AF65-F5344CB8AC3E}">
+        <p14:creationId xmlns:p14="http://schemas.microsoft.com/office/powerpoint/2010/main" val="356911911"/>
+      </p:ext>
+    </p:extLst>
+  </p:cSld>
+  <p:clrMapOvr>
+    <a:overrideClrMapping bg1="lt1" tx1="dk1" bg2="lt2" tx2="dk2" accent1="accent1" accent2="accent2" accent3="accent3" accent4="accent4" accent5="accent5" accent6="accent6" hlink="hlink" folHlink="folHlink"/>
+  </p:clrMapOvr>
+  <p:transition>
+    <p:fade thruBlk="1"/>
+  </p:transition>
+</p:sldLayout>
+</file>
+
+<file path=ppt/slideLayouts/slideLayout3.xml><?xml version="1.0" encoding="utf-8"?>
+<p:sldLayout xmlns:a="http://schemas.openxmlformats.org/drawingml/2006/main" xmlns:r="http://schemas.openxmlformats.org/officeDocument/2006/relationships" xmlns:p="http://schemas.openxmlformats.org/presentationml/2006/main" userDrawn="1">
   <p:cSld name="Title + 1 column">
     <p:spTree>
       <p:nvGrpSpPr>
@@ -1670,252 +1689,6 @@
           <a:chExt cx="0" cy="0"/>
         </a:xfrm>
       </p:grpSpPr>
-      <p:cxnSp>
-        <p:nvCxnSpPr>
-          <p:cNvPr id="24" name="Shape 24"/>
-          <p:cNvCxnSpPr/>
-          <p:nvPr/>
-        </p:nvCxnSpPr>
-        <p:spPr>
-          <a:xfrm>
-            <a:off x="7764" y="331688"/>
-            <a:ext cx="1375800" cy="0"/>
-          </a:xfrm>
-          <a:prstGeom prst="straightConnector1">
-            <a:avLst/>
-          </a:prstGeom>
-          <a:noFill/>
-          <a:ln w="9525" cap="flat" cmpd="sng">
-            <a:solidFill>
-              <a:srgbClr val="CCCCCC"/>
-            </a:solidFill>
-            <a:prstDash val="solid"/>
-            <a:round/>
-            <a:headEnd type="none" w="lg" len="lg"/>
-            <a:tailEnd type="none" w="lg" len="lg"/>
-          </a:ln>
-        </p:spPr>
-      </p:cxnSp>
-      <p:sp>
-        <p:nvSpPr>
-          <p:cNvPr id="25" name="Shape 25"/>
-          <p:cNvSpPr/>
-          <p:nvPr/>
-        </p:nvSpPr>
-        <p:spPr>
-          <a:xfrm>
-            <a:off x="789120" y="128738"/>
-            <a:ext cx="405900" cy="405900"/>
-          </a:xfrm>
-          <a:prstGeom prst="ellipse">
-            <a:avLst/>
-          </a:prstGeom>
-          <a:solidFill>
-            <a:srgbClr val="FFCD00"/>
-          </a:solidFill>
-          <a:ln>
-            <a:noFill/>
-          </a:ln>
-        </p:spPr>
-        <p:txBody>
-          <a:bodyPr wrap="square" lIns="91425" tIns="91425" rIns="91425" bIns="91425" anchor="ctr" anchorCtr="0">
-            <a:noAutofit/>
-          </a:bodyPr>
-          <a:lstStyle/>
-          <a:p>
-            <a:pPr lvl="0" rtl="0">
-              <a:spcBef>
-                <a:spcPts val="0"/>
-              </a:spcBef>
-              <a:buNone/>
-            </a:pPr>
-            <a:endParaRPr/>
-          </a:p>
-        </p:txBody>
-      </p:sp>
-      <p:sp>
-        <p:nvSpPr>
-          <p:cNvPr id="26" name="Shape 26"/>
-          <p:cNvSpPr txBox="1">
-            <a:spLocks noGrp="1"/>
-          </p:cNvSpPr>
-          <p:nvPr>
-            <p:ph type="title"/>
-          </p:nvPr>
-        </p:nvSpPr>
-        <p:spPr>
-          <a:xfrm>
-            <a:off x="1387250" y="67960"/>
-            <a:ext cx="3878400" cy="435600"/>
-          </a:xfrm>
-          <a:prstGeom prst="rect">
-            <a:avLst/>
-          </a:prstGeom>
-          <a:ln>
-            <a:solidFill>
-              <a:srgbClr val="CCCCCC"/>
-            </a:solidFill>
-          </a:ln>
-        </p:spPr>
-        <p:txBody>
-          <a:bodyPr wrap="square" lIns="91425" tIns="91425" rIns="91425" bIns="91425" anchor="ctr" anchorCtr="0"/>
-          <a:lstStyle>
-            <a:lvl1pPr lvl="0" rtl="0">
-              <a:spcBef>
-                <a:spcPts val="0"/>
-              </a:spcBef>
-              <a:buSzPct val="100000"/>
-              <a:buFont typeface="Lora"/>
-              <a:buNone/>
-              <a:defRPr sz="2000" b="1">
-                <a:latin typeface="Lora"/>
-                <a:ea typeface="Lora"/>
-                <a:cs typeface="Lora"/>
-                <a:sym typeface="Lora"/>
-              </a:defRPr>
-            </a:lvl1pPr>
-            <a:lvl2pPr lvl="1" rtl="0">
-              <a:spcBef>
-                <a:spcPts val="0"/>
-              </a:spcBef>
-              <a:buSzPct val="100000"/>
-              <a:buFont typeface="Lora"/>
-              <a:buNone/>
-              <a:defRPr sz="2000" b="1">
-                <a:highlight>
-                  <a:srgbClr val="FFFFFF"/>
-                </a:highlight>
-                <a:latin typeface="Lora"/>
-                <a:ea typeface="Lora"/>
-                <a:cs typeface="Lora"/>
-                <a:sym typeface="Lora"/>
-              </a:defRPr>
-            </a:lvl2pPr>
-            <a:lvl3pPr lvl="2" rtl="0">
-              <a:spcBef>
-                <a:spcPts val="0"/>
-              </a:spcBef>
-              <a:buSzPct val="100000"/>
-              <a:buFont typeface="Lora"/>
-              <a:buNone/>
-              <a:defRPr sz="2000" b="1">
-                <a:highlight>
-                  <a:srgbClr val="FFFFFF"/>
-                </a:highlight>
-                <a:latin typeface="Lora"/>
-                <a:ea typeface="Lora"/>
-                <a:cs typeface="Lora"/>
-                <a:sym typeface="Lora"/>
-              </a:defRPr>
-            </a:lvl3pPr>
-            <a:lvl4pPr lvl="3" rtl="0">
-              <a:spcBef>
-                <a:spcPts val="0"/>
-              </a:spcBef>
-              <a:buSzPct val="100000"/>
-              <a:buFont typeface="Lora"/>
-              <a:buNone/>
-              <a:defRPr sz="2000" b="1">
-                <a:highlight>
-                  <a:srgbClr val="FFFFFF"/>
-                </a:highlight>
-                <a:latin typeface="Lora"/>
-                <a:ea typeface="Lora"/>
-                <a:cs typeface="Lora"/>
-                <a:sym typeface="Lora"/>
-              </a:defRPr>
-            </a:lvl4pPr>
-            <a:lvl5pPr lvl="4" rtl="0">
-              <a:spcBef>
-                <a:spcPts val="0"/>
-              </a:spcBef>
-              <a:buSzPct val="100000"/>
-              <a:buFont typeface="Lora"/>
-              <a:buNone/>
-              <a:defRPr sz="2000" b="1">
-                <a:highlight>
-                  <a:srgbClr val="FFFFFF"/>
-                </a:highlight>
-                <a:latin typeface="Lora"/>
-                <a:ea typeface="Lora"/>
-                <a:cs typeface="Lora"/>
-                <a:sym typeface="Lora"/>
-              </a:defRPr>
-            </a:lvl5pPr>
-            <a:lvl6pPr lvl="5" rtl="0">
-              <a:spcBef>
-                <a:spcPts val="0"/>
-              </a:spcBef>
-              <a:buSzPct val="100000"/>
-              <a:buFont typeface="Lora"/>
-              <a:buNone/>
-              <a:defRPr sz="2000" b="1">
-                <a:highlight>
-                  <a:srgbClr val="FFFFFF"/>
-                </a:highlight>
-                <a:latin typeface="Lora"/>
-                <a:ea typeface="Lora"/>
-                <a:cs typeface="Lora"/>
-                <a:sym typeface="Lora"/>
-              </a:defRPr>
-            </a:lvl6pPr>
-            <a:lvl7pPr lvl="6" rtl="0">
-              <a:spcBef>
-                <a:spcPts val="0"/>
-              </a:spcBef>
-              <a:buSzPct val="100000"/>
-              <a:buFont typeface="Lora"/>
-              <a:buNone/>
-              <a:defRPr sz="2000" b="1">
-                <a:highlight>
-                  <a:srgbClr val="FFFFFF"/>
-                </a:highlight>
-                <a:latin typeface="Lora"/>
-                <a:ea typeface="Lora"/>
-                <a:cs typeface="Lora"/>
-                <a:sym typeface="Lora"/>
-              </a:defRPr>
-            </a:lvl7pPr>
-            <a:lvl8pPr lvl="7" rtl="0">
-              <a:spcBef>
-                <a:spcPts val="0"/>
-              </a:spcBef>
-              <a:buSzPct val="100000"/>
-              <a:buFont typeface="Lora"/>
-              <a:buNone/>
-              <a:defRPr sz="2000" b="1">
-                <a:highlight>
-                  <a:srgbClr val="FFFFFF"/>
-                </a:highlight>
-                <a:latin typeface="Lora"/>
-                <a:ea typeface="Lora"/>
-                <a:cs typeface="Lora"/>
-                <a:sym typeface="Lora"/>
-              </a:defRPr>
-            </a:lvl8pPr>
-            <a:lvl9pPr lvl="8" rtl="0">
-              <a:spcBef>
-                <a:spcPts val="0"/>
-              </a:spcBef>
-              <a:buSzPct val="100000"/>
-              <a:buFont typeface="Lora"/>
-              <a:buNone/>
-              <a:defRPr sz="2000" b="1">
-                <a:highlight>
-                  <a:srgbClr val="FFFFFF"/>
-                </a:highlight>
-                <a:latin typeface="Lora"/>
-                <a:ea typeface="Lora"/>
-                <a:cs typeface="Lora"/>
-                <a:sym typeface="Lora"/>
-              </a:defRPr>
-            </a:lvl9pPr>
-          </a:lstStyle>
-          <a:p>
-            <a:endParaRPr dirty="0"/>
-          </a:p>
-        </p:txBody>
-      </p:sp>
       <p:sp>
         <p:nvSpPr>
           <p:cNvPr id="27" name="Shape 27"/>
@@ -1928,8 +1701,8 @@
         </p:nvSpPr>
         <p:spPr>
           <a:xfrm>
-            <a:off x="1383564" y="706510"/>
-            <a:ext cx="6809700" cy="3112200"/>
+            <a:off x="289932" y="1048214"/>
+            <a:ext cx="8307658" cy="3530497"/>
           </a:xfrm>
           <a:prstGeom prst="rect">
             <a:avLst/>
@@ -2085,594 +1858,10 @@
             </a:lvl9pPr>
           </a:lstStyle>
           <a:p>
-            <a:endParaRPr/>
+            <a:endParaRPr dirty="0"/>
           </a:p>
         </p:txBody>
       </p:sp>
-      <p:cxnSp>
-        <p:nvCxnSpPr>
-          <p:cNvPr id="28" name="Shape 28"/>
-          <p:cNvCxnSpPr/>
-          <p:nvPr/>
-        </p:nvCxnSpPr>
-        <p:spPr>
-          <a:xfrm>
-            <a:off x="5265650" y="310609"/>
-            <a:ext cx="3878400" cy="0"/>
-          </a:xfrm>
-          <a:prstGeom prst="straightConnector1">
-            <a:avLst/>
-          </a:prstGeom>
-          <a:noFill/>
-          <a:ln w="9525" cap="flat" cmpd="sng">
-            <a:solidFill>
-              <a:srgbClr val="CCCCCC"/>
-            </a:solidFill>
-            <a:prstDash val="solid"/>
-            <a:round/>
-            <a:headEnd type="none" w="lg" len="lg"/>
-            <a:tailEnd type="none" w="lg" len="lg"/>
-          </a:ln>
-        </p:spPr>
-      </p:cxnSp>
-      <p:grpSp>
-        <p:nvGrpSpPr>
-          <p:cNvPr id="7" name="Shape 77"/>
-          <p:cNvGrpSpPr/>
-          <p:nvPr userDrawn="1"/>
-        </p:nvGrpSpPr>
-        <p:grpSpPr>
-          <a:xfrm>
-            <a:off x="874926" y="224375"/>
-            <a:ext cx="214625" cy="214625"/>
-            <a:chOff x="2594050" y="1631825"/>
-            <a:chExt cx="439625" cy="439625"/>
-          </a:xfrm>
-        </p:grpSpPr>
-        <p:sp>
-          <p:nvSpPr>
-            <p:cNvPr id="8" name="Shape 78"/>
-            <p:cNvSpPr/>
-            <p:nvPr/>
-          </p:nvSpPr>
-          <p:spPr>
-            <a:xfrm>
-              <a:off x="2594050" y="1883300"/>
-              <a:ext cx="188175" cy="188150"/>
-            </a:xfrm>
-            <a:custGeom>
-              <a:avLst/>
-              <a:gdLst/>
-              <a:ahLst/>
-              <a:cxnLst/>
-              <a:rect l="0" t="0" r="0" b="0"/>
-              <a:pathLst>
-                <a:path w="7527" h="7526" fill="none" extrusionOk="0">
-                  <a:moveTo>
-                    <a:pt x="5992" y="0"/>
-                  </a:moveTo>
-                  <a:lnTo>
-                    <a:pt x="537" y="6430"/>
-                  </a:lnTo>
-                  <a:lnTo>
-                    <a:pt x="1" y="7526"/>
-                  </a:lnTo>
-                  <a:lnTo>
-                    <a:pt x="1097" y="6990"/>
-                  </a:lnTo>
-                  <a:lnTo>
-                    <a:pt x="7526" y="1534"/>
-                  </a:lnTo>
-                  <a:lnTo>
-                    <a:pt x="5992" y="0"/>
-                  </a:lnTo>
-                  <a:close/>
-                </a:path>
-              </a:pathLst>
-            </a:custGeom>
-            <a:noFill/>
-            <a:ln w="9525" cap="rnd" cmpd="sng">
-              <a:solidFill>
-                <a:srgbClr val="000000"/>
-              </a:solidFill>
-              <a:prstDash val="solid"/>
-              <a:round/>
-              <a:headEnd type="none" w="med" len="med"/>
-              <a:tailEnd type="none" w="med" len="med"/>
-            </a:ln>
-          </p:spPr>
-          <p:txBody>
-            <a:bodyPr wrap="square" lIns="91425" tIns="91425" rIns="91425" bIns="91425" anchor="ctr" anchorCtr="0">
-              <a:noAutofit/>
-            </a:bodyPr>
-            <a:lstStyle/>
-            <a:p>
-              <a:pPr lvl="0">
-                <a:spcBef>
-                  <a:spcPts val="0"/>
-                </a:spcBef>
-                <a:buNone/>
-              </a:pPr>
-              <a:endParaRPr/>
-            </a:p>
-          </p:txBody>
-        </p:sp>
-        <p:sp>
-          <p:nvSpPr>
-            <p:cNvPr id="9" name="Shape 79"/>
-            <p:cNvSpPr/>
-            <p:nvPr/>
-          </p:nvSpPr>
-          <p:spPr>
-            <a:xfrm>
-              <a:off x="2857700" y="1631825"/>
-              <a:ext cx="175975" cy="176000"/>
-            </a:xfrm>
-            <a:custGeom>
-              <a:avLst/>
-              <a:gdLst/>
-              <a:ahLst/>
-              <a:cxnLst/>
-              <a:rect l="0" t="0" r="0" b="0"/>
-              <a:pathLst>
-                <a:path w="7039" h="7040" fill="none" extrusionOk="0">
-                  <a:moveTo>
-                    <a:pt x="268" y="2704"/>
-                  </a:moveTo>
-                  <a:lnTo>
-                    <a:pt x="4336" y="6771"/>
-                  </a:lnTo>
-                  <a:lnTo>
-                    <a:pt x="4336" y="6771"/>
-                  </a:lnTo>
-                  <a:lnTo>
-                    <a:pt x="4336" y="6771"/>
-                  </a:lnTo>
-                  <a:lnTo>
-                    <a:pt x="4652" y="6917"/>
-                  </a:lnTo>
-                  <a:lnTo>
-                    <a:pt x="4993" y="7015"/>
-                  </a:lnTo>
-                  <a:lnTo>
-                    <a:pt x="5310" y="7039"/>
-                  </a:lnTo>
-                  <a:lnTo>
-                    <a:pt x="5651" y="7039"/>
-                  </a:lnTo>
-                  <a:lnTo>
-                    <a:pt x="5992" y="6966"/>
-                  </a:lnTo>
-                  <a:lnTo>
-                    <a:pt x="6308" y="6844"/>
-                  </a:lnTo>
-                  <a:lnTo>
-                    <a:pt x="6454" y="6747"/>
-                  </a:lnTo>
-                  <a:lnTo>
-                    <a:pt x="6601" y="6674"/>
-                  </a:lnTo>
-                  <a:lnTo>
-                    <a:pt x="6747" y="6552"/>
-                  </a:lnTo>
-                  <a:lnTo>
-                    <a:pt x="6893" y="6430"/>
-                  </a:lnTo>
-                  <a:lnTo>
-                    <a:pt x="6893" y="6430"/>
-                  </a:lnTo>
-                  <a:lnTo>
-                    <a:pt x="6942" y="6357"/>
-                  </a:lnTo>
-                  <a:lnTo>
-                    <a:pt x="7015" y="6260"/>
-                  </a:lnTo>
-                  <a:lnTo>
-                    <a:pt x="7039" y="6138"/>
-                  </a:lnTo>
-                  <a:lnTo>
-                    <a:pt x="7039" y="6041"/>
-                  </a:lnTo>
-                  <a:lnTo>
-                    <a:pt x="7039" y="6041"/>
-                  </a:lnTo>
-                  <a:lnTo>
-                    <a:pt x="7039" y="5943"/>
-                  </a:lnTo>
-                  <a:lnTo>
-                    <a:pt x="7015" y="5846"/>
-                  </a:lnTo>
-                  <a:lnTo>
-                    <a:pt x="6942" y="5748"/>
-                  </a:lnTo>
-                  <a:lnTo>
-                    <a:pt x="6893" y="5651"/>
-                  </a:lnTo>
-                  <a:lnTo>
-                    <a:pt x="1389" y="147"/>
-                  </a:lnTo>
-                  <a:lnTo>
-                    <a:pt x="1389" y="147"/>
-                  </a:lnTo>
-                  <a:lnTo>
-                    <a:pt x="1291" y="98"/>
-                  </a:lnTo>
-                  <a:lnTo>
-                    <a:pt x="1194" y="25"/>
-                  </a:lnTo>
-                  <a:lnTo>
-                    <a:pt x="1096" y="0"/>
-                  </a:lnTo>
-                  <a:lnTo>
-                    <a:pt x="999" y="0"/>
-                  </a:lnTo>
-                  <a:lnTo>
-                    <a:pt x="999" y="0"/>
-                  </a:lnTo>
-                  <a:lnTo>
-                    <a:pt x="902" y="0"/>
-                  </a:lnTo>
-                  <a:lnTo>
-                    <a:pt x="780" y="25"/>
-                  </a:lnTo>
-                  <a:lnTo>
-                    <a:pt x="682" y="98"/>
-                  </a:lnTo>
-                  <a:lnTo>
-                    <a:pt x="609" y="147"/>
-                  </a:lnTo>
-                  <a:lnTo>
-                    <a:pt x="609" y="147"/>
-                  </a:lnTo>
-                  <a:lnTo>
-                    <a:pt x="487" y="293"/>
-                  </a:lnTo>
-                  <a:lnTo>
-                    <a:pt x="366" y="439"/>
-                  </a:lnTo>
-                  <a:lnTo>
-                    <a:pt x="293" y="585"/>
-                  </a:lnTo>
-                  <a:lnTo>
-                    <a:pt x="195" y="731"/>
-                  </a:lnTo>
-                  <a:lnTo>
-                    <a:pt x="73" y="1048"/>
-                  </a:lnTo>
-                  <a:lnTo>
-                    <a:pt x="0" y="1389"/>
-                  </a:lnTo>
-                  <a:lnTo>
-                    <a:pt x="0" y="1730"/>
-                  </a:lnTo>
-                  <a:lnTo>
-                    <a:pt x="25" y="2046"/>
-                  </a:lnTo>
-                  <a:lnTo>
-                    <a:pt x="122" y="2387"/>
-                  </a:lnTo>
-                  <a:lnTo>
-                    <a:pt x="268" y="2704"/>
-                  </a:lnTo>
-                  <a:lnTo>
-                    <a:pt x="268" y="2704"/>
-                  </a:lnTo>
-                  <a:close/>
-                </a:path>
-              </a:pathLst>
-            </a:custGeom>
-            <a:noFill/>
-            <a:ln w="9525" cap="rnd" cmpd="sng">
-              <a:solidFill>
-                <a:srgbClr val="000000"/>
-              </a:solidFill>
-              <a:prstDash val="solid"/>
-              <a:round/>
-              <a:headEnd type="none" w="med" len="med"/>
-              <a:tailEnd type="none" w="med" len="med"/>
-            </a:ln>
-          </p:spPr>
-          <p:txBody>
-            <a:bodyPr wrap="square" lIns="91425" tIns="91425" rIns="91425" bIns="91425" anchor="ctr" anchorCtr="0">
-              <a:noAutofit/>
-            </a:bodyPr>
-            <a:lstStyle/>
-            <a:p>
-              <a:pPr lvl="0">
-                <a:spcBef>
-                  <a:spcPts val="0"/>
-                </a:spcBef>
-                <a:buNone/>
-              </a:pPr>
-              <a:endParaRPr/>
-            </a:p>
-          </p:txBody>
-        </p:sp>
-        <p:sp>
-          <p:nvSpPr>
-            <p:cNvPr id="10" name="Shape 80"/>
-            <p:cNvSpPr/>
-            <p:nvPr/>
-          </p:nvSpPr>
-          <p:spPr>
-            <a:xfrm>
-              <a:off x="2662850" y="1699400"/>
-              <a:ext cx="303250" cy="303250"/>
-            </a:xfrm>
-            <a:custGeom>
-              <a:avLst/>
-              <a:gdLst/>
-              <a:ahLst/>
-              <a:cxnLst/>
-              <a:rect l="0" t="0" r="0" b="0"/>
-              <a:pathLst>
-                <a:path w="12130" h="12130" fill="none" extrusionOk="0">
-                  <a:moveTo>
-                    <a:pt x="8038" y="1"/>
-                  </a:moveTo>
-                  <a:lnTo>
-                    <a:pt x="4872" y="3191"/>
-                  </a:lnTo>
-                  <a:lnTo>
-                    <a:pt x="4872" y="3191"/>
-                  </a:lnTo>
-                  <a:lnTo>
-                    <a:pt x="4628" y="3094"/>
-                  </a:lnTo>
-                  <a:lnTo>
-                    <a:pt x="4385" y="2997"/>
-                  </a:lnTo>
-                  <a:lnTo>
-                    <a:pt x="4092" y="2899"/>
-                  </a:lnTo>
-                  <a:lnTo>
-                    <a:pt x="3800" y="2850"/>
-                  </a:lnTo>
-                  <a:lnTo>
-                    <a:pt x="3484" y="2777"/>
-                  </a:lnTo>
-                  <a:lnTo>
-                    <a:pt x="3167" y="2729"/>
-                  </a:lnTo>
-                  <a:lnTo>
-                    <a:pt x="2850" y="2704"/>
-                  </a:lnTo>
-                  <a:lnTo>
-                    <a:pt x="2534" y="2704"/>
-                  </a:lnTo>
-                  <a:lnTo>
-                    <a:pt x="2534" y="2704"/>
-                  </a:lnTo>
-                  <a:lnTo>
-                    <a:pt x="2241" y="2704"/>
-                  </a:lnTo>
-                  <a:lnTo>
-                    <a:pt x="1949" y="2729"/>
-                  </a:lnTo>
-                  <a:lnTo>
-                    <a:pt x="1633" y="2777"/>
-                  </a:lnTo>
-                  <a:lnTo>
-                    <a:pt x="1316" y="2850"/>
-                  </a:lnTo>
-                  <a:lnTo>
-                    <a:pt x="999" y="2972"/>
-                  </a:lnTo>
-                  <a:lnTo>
-                    <a:pt x="707" y="3094"/>
-                  </a:lnTo>
-                  <a:lnTo>
-                    <a:pt x="415" y="3289"/>
-                  </a:lnTo>
-                  <a:lnTo>
-                    <a:pt x="147" y="3508"/>
-                  </a:lnTo>
-                  <a:lnTo>
-                    <a:pt x="147" y="3508"/>
-                  </a:lnTo>
-                  <a:lnTo>
-                    <a:pt x="74" y="3581"/>
-                  </a:lnTo>
-                  <a:lnTo>
-                    <a:pt x="25" y="3678"/>
-                  </a:lnTo>
-                  <a:lnTo>
-                    <a:pt x="1" y="3776"/>
-                  </a:lnTo>
-                  <a:lnTo>
-                    <a:pt x="1" y="3898"/>
-                  </a:lnTo>
-                  <a:lnTo>
-                    <a:pt x="1" y="3898"/>
-                  </a:lnTo>
-                  <a:lnTo>
-                    <a:pt x="1" y="3995"/>
-                  </a:lnTo>
-                  <a:lnTo>
-                    <a:pt x="25" y="4093"/>
-                  </a:lnTo>
-                  <a:lnTo>
-                    <a:pt x="74" y="4190"/>
-                  </a:lnTo>
-                  <a:lnTo>
-                    <a:pt x="147" y="4287"/>
-                  </a:lnTo>
-                  <a:lnTo>
-                    <a:pt x="7843" y="11984"/>
-                  </a:lnTo>
-                  <a:lnTo>
-                    <a:pt x="7843" y="11984"/>
-                  </a:lnTo>
-                  <a:lnTo>
-                    <a:pt x="7941" y="12057"/>
-                  </a:lnTo>
-                  <a:lnTo>
-                    <a:pt x="8038" y="12105"/>
-                  </a:lnTo>
-                  <a:lnTo>
-                    <a:pt x="8135" y="12130"/>
-                  </a:lnTo>
-                  <a:lnTo>
-                    <a:pt x="8233" y="12130"/>
-                  </a:lnTo>
-                  <a:lnTo>
-                    <a:pt x="8233" y="12130"/>
-                  </a:lnTo>
-                  <a:lnTo>
-                    <a:pt x="8355" y="12130"/>
-                  </a:lnTo>
-                  <a:lnTo>
-                    <a:pt x="8452" y="12105"/>
-                  </a:lnTo>
-                  <a:lnTo>
-                    <a:pt x="8549" y="12057"/>
-                  </a:lnTo>
-                  <a:lnTo>
-                    <a:pt x="8622" y="11984"/>
-                  </a:lnTo>
-                  <a:lnTo>
-                    <a:pt x="8622" y="11984"/>
-                  </a:lnTo>
-                  <a:lnTo>
-                    <a:pt x="8842" y="11716"/>
-                  </a:lnTo>
-                  <a:lnTo>
-                    <a:pt x="9036" y="11423"/>
-                  </a:lnTo>
-                  <a:lnTo>
-                    <a:pt x="9158" y="11131"/>
-                  </a:lnTo>
-                  <a:lnTo>
-                    <a:pt x="9280" y="10814"/>
-                  </a:lnTo>
-                  <a:lnTo>
-                    <a:pt x="9353" y="10498"/>
-                  </a:lnTo>
-                  <a:lnTo>
-                    <a:pt x="9402" y="10181"/>
-                  </a:lnTo>
-                  <a:lnTo>
-                    <a:pt x="9426" y="9889"/>
-                  </a:lnTo>
-                  <a:lnTo>
-                    <a:pt x="9426" y="9597"/>
-                  </a:lnTo>
-                  <a:lnTo>
-                    <a:pt x="9426" y="9597"/>
-                  </a:lnTo>
-                  <a:lnTo>
-                    <a:pt x="9426" y="9280"/>
-                  </a:lnTo>
-                  <a:lnTo>
-                    <a:pt x="9402" y="8964"/>
-                  </a:lnTo>
-                  <a:lnTo>
-                    <a:pt x="9353" y="8647"/>
-                  </a:lnTo>
-                  <a:lnTo>
-                    <a:pt x="9280" y="8330"/>
-                  </a:lnTo>
-                  <a:lnTo>
-                    <a:pt x="9231" y="8038"/>
-                  </a:lnTo>
-                  <a:lnTo>
-                    <a:pt x="9134" y="7746"/>
-                  </a:lnTo>
-                  <a:lnTo>
-                    <a:pt x="9036" y="7502"/>
-                  </a:lnTo>
-                  <a:lnTo>
-                    <a:pt x="8939" y="7259"/>
-                  </a:lnTo>
-                  <a:lnTo>
-                    <a:pt x="12130" y="4093"/>
-                  </a:lnTo>
-                </a:path>
-              </a:pathLst>
-            </a:custGeom>
-            <a:noFill/>
-            <a:ln w="9525" cap="rnd" cmpd="sng">
-              <a:solidFill>
-                <a:srgbClr val="000000"/>
-              </a:solidFill>
-              <a:prstDash val="solid"/>
-              <a:round/>
-              <a:headEnd type="none" w="med" len="med"/>
-              <a:tailEnd type="none" w="med" len="med"/>
-            </a:ln>
-          </p:spPr>
-          <p:txBody>
-            <a:bodyPr wrap="square" lIns="91425" tIns="91425" rIns="91425" bIns="91425" anchor="ctr" anchorCtr="0">
-              <a:noAutofit/>
-            </a:bodyPr>
-            <a:lstStyle/>
-            <a:p>
-              <a:pPr lvl="0">
-                <a:spcBef>
-                  <a:spcPts val="0"/>
-                </a:spcBef>
-                <a:buNone/>
-              </a:pPr>
-              <a:endParaRPr/>
-            </a:p>
-          </p:txBody>
-        </p:sp>
-        <p:sp>
-          <p:nvSpPr>
-            <p:cNvPr id="11" name="Shape 81"/>
-            <p:cNvSpPr/>
-            <p:nvPr/>
-          </p:nvSpPr>
-          <p:spPr>
-            <a:xfrm>
-              <a:off x="2814912" y="1754062"/>
-              <a:ext cx="49950" cy="49950"/>
-            </a:xfrm>
-            <a:custGeom>
-              <a:avLst/>
-              <a:gdLst/>
-              <a:ahLst/>
-              <a:cxnLst/>
-              <a:rect l="0" t="0" r="0" b="0"/>
-              <a:pathLst>
-                <a:path w="1998" h="1998" fill="none" extrusionOk="0">
-                  <a:moveTo>
-                    <a:pt x="1" y="1997"/>
-                  </a:moveTo>
-                  <a:lnTo>
-                    <a:pt x="1998" y="0"/>
-                  </a:lnTo>
-                </a:path>
-              </a:pathLst>
-            </a:custGeom>
-            <a:noFill/>
-            <a:ln w="9525" cap="rnd" cmpd="sng">
-              <a:solidFill>
-                <a:srgbClr val="000000"/>
-              </a:solidFill>
-              <a:prstDash val="solid"/>
-              <a:round/>
-              <a:headEnd type="none" w="med" len="med"/>
-              <a:tailEnd type="none" w="med" len="med"/>
-            </a:ln>
-          </p:spPr>
-          <p:txBody>
-            <a:bodyPr wrap="square" lIns="91425" tIns="91425" rIns="91425" bIns="91425" anchor="ctr" anchorCtr="0">
-              <a:noAutofit/>
-            </a:bodyPr>
-            <a:lstStyle/>
-            <a:p>
-              <a:pPr lvl="0">
-                <a:spcBef>
-                  <a:spcPts val="0"/>
-                </a:spcBef>
-                <a:buNone/>
-              </a:pPr>
-              <a:endParaRPr/>
-            </a:p>
-          </p:txBody>
-        </p:sp>
-      </p:grpSp>
       <p:sp>
         <p:nvSpPr>
           <p:cNvPr id="12" name="Shape 75"/>
@@ -2719,6 +1908,62 @@
   <p:clrMapOvr>
     <a:masterClrMapping/>
   </p:clrMapOvr>
+</p:sldLayout>
+</file>
+
+<file path=ppt/slideLayouts/slideLayout4.xml><?xml version="1.0" encoding="utf-8"?>
+<p:sldLayout xmlns:a="http://schemas.openxmlformats.org/drawingml/2006/main" xmlns:r="http://schemas.openxmlformats.org/officeDocument/2006/relationships" xmlns:p="http://schemas.openxmlformats.org/presentationml/2006/main" preserve="1" userDrawn="1">
+  <p:cSld name="1_Custom Layout">
+    <p:spTree>
+      <p:nvGrpSpPr>
+        <p:cNvPr id="1" name=""/>
+        <p:cNvGrpSpPr/>
+        <p:nvPr/>
+      </p:nvGrpSpPr>
+      <p:grpSpPr>
+        <a:xfrm>
+          <a:off x="0" y="0"/>
+          <a:ext cx="0" cy="0"/>
+          <a:chOff x="0" y="0"/>
+          <a:chExt cx="0" cy="0"/>
+        </a:xfrm>
+      </p:grpSpPr>
+      <p:sp>
+        <p:nvSpPr>
+          <p:cNvPr id="2" name="Title 1"/>
+          <p:cNvSpPr>
+            <a:spLocks noGrp="1"/>
+          </p:cNvSpPr>
+          <p:nvPr>
+            <p:ph type="title"/>
+          </p:nvPr>
+        </p:nvSpPr>
+        <p:spPr/>
+        <p:txBody>
+          <a:bodyPr/>
+          <a:lstStyle/>
+          <a:p>
+            <a:r>
+              <a:rPr lang="en-US" smtClean="0"/>
+              <a:t>Click to edit Master title style</a:t>
+            </a:r>
+            <a:endParaRPr lang="en-US"/>
+          </a:p>
+        </p:txBody>
+      </p:sp>
+    </p:spTree>
+    <p:extLst>
+      <p:ext uri="{BB962C8B-B14F-4D97-AF65-F5344CB8AC3E}">
+        <p14:creationId xmlns:p14="http://schemas.microsoft.com/office/powerpoint/2010/main" val="735678087"/>
+      </p:ext>
+    </p:extLst>
+  </p:cSld>
+  <p:clrMapOvr>
+    <a:masterClrMapping/>
+  </p:clrMapOvr>
+  <p:transition>
+    <p:fade thruBlk="1"/>
+  </p:transition>
 </p:sldLayout>
 </file>
 
@@ -2759,8 +2004,8 @@
         </p:nvSpPr>
         <p:spPr>
           <a:xfrm>
-            <a:off x="1381250" y="1616470"/>
-            <a:ext cx="6809700" cy="3112200"/>
+            <a:off x="234175" y="1260088"/>
+            <a:ext cx="8642195" cy="3468582"/>
           </a:xfrm>
           <a:prstGeom prst="rect">
             <a:avLst/>
@@ -2928,7 +2173,7 @@
             </a:lvl9pPr>
           </a:lstStyle>
           <a:p>
-            <a:endParaRPr/>
+            <a:endParaRPr dirty="0"/>
           </a:p>
         </p:txBody>
       </p:sp>
@@ -2944,8 +2189,8 @@
         </p:nvSpPr>
         <p:spPr>
           <a:xfrm>
-            <a:off x="1381250" y="937117"/>
-            <a:ext cx="6809700" cy="435600"/>
+            <a:off x="234176" y="423746"/>
+            <a:ext cx="7237141" cy="624469"/>
           </a:xfrm>
           <a:prstGeom prst="rect">
             <a:avLst/>
@@ -3086,7 +2331,7 @@
             </a:lvl9pPr>
           </a:lstStyle>
           <a:p>
-            <a:endParaRPr/>
+            <a:endParaRPr dirty="0"/>
           </a:p>
         </p:txBody>
       </p:sp>
@@ -3140,7 +2385,7 @@
           <p:nvPr userDrawn="1"/>
         </p:nvPicPr>
         <p:blipFill>
-          <a:blip r:embed="rId4">
+          <a:blip r:embed="rId6">
             <a:extLst>
               <a:ext uri="{28A0092B-C50C-407E-A947-70E740481C1C}">
                 <a14:useLocalDpi xmlns:a14="http://schemas.microsoft.com/office/drawing/2010/main" val="0"/>
@@ -3153,8 +2398,8 @@
         </p:blipFill>
         <p:spPr>
           <a:xfrm>
-            <a:off x="5651" y="0"/>
-            <a:ext cx="853886" cy="319674"/>
+            <a:off x="7551394" y="-1"/>
+            <a:ext cx="1548880" cy="579863"/>
           </a:xfrm>
           <a:prstGeom prst="rect">
             <a:avLst/>
@@ -3166,7 +2411,9 @@
   <p:clrMap bg1="lt1" tx1="dk1" bg2="dk2" tx2="lt2" accent1="accent1" accent2="accent2" accent3="accent3" accent4="accent4" accent5="accent5" accent6="accent6" hlink="hlink" folHlink="folHlink"/>
   <p:sldLayoutIdLst>
     <p:sldLayoutId id="2147483648" r:id="rId1"/>
-    <p:sldLayoutId id="2147483651" r:id="rId2"/>
+    <p:sldLayoutId id="2147483659" r:id="rId2"/>
+    <p:sldLayoutId id="2147483651" r:id="rId3"/>
+    <p:sldLayoutId id="2147483660" r:id="rId4"/>
   </p:sldLayoutIdLst>
   <p:transition>
     <p:fade thruBlk="1"/>
@@ -3639,7 +2886,7 @@
             <a:spLocks noGrp="1"/>
           </p:cNvSpPr>
           <p:nvPr>
-            <p:ph type="ctrTitle"/>
+            <p:ph type="ctrTitle" idx="4294967295"/>
           </p:nvPr>
         </p:nvSpPr>
         <p:spPr>
@@ -3664,864 +2911,10 @@
               <a:buNone/>
             </a:pPr>
             <a:r>
-              <a:rPr lang="en-US" smtClean="0"/>
-              <a:t>Angular </a:t>
+              <a:rPr lang="en-US" sz="3200" dirty="0" smtClean="0"/>
+              <a:t>Angular JS </a:t>
             </a:r>
-            <a:r>
-              <a:rPr lang="en-US" smtClean="0"/>
-              <a:t>JS </a:t>
-            </a:r>
-            <a:endParaRPr lang="en" dirty="0"/>
-          </a:p>
-        </p:txBody>
-      </p:sp>
-      <p:grpSp>
-        <p:nvGrpSpPr>
-          <p:cNvPr id="62" name="Shape 62"/>
-          <p:cNvGrpSpPr/>
-          <p:nvPr/>
-        </p:nvGrpSpPr>
-        <p:grpSpPr>
-          <a:xfrm>
-            <a:off x="1299165" y="3511424"/>
-            <a:ext cx="215966" cy="342399"/>
-            <a:chOff x="6718575" y="2318625"/>
-            <a:chExt cx="256950" cy="407375"/>
-          </a:xfrm>
-        </p:grpSpPr>
-        <p:sp>
-          <p:nvSpPr>
-            <p:cNvPr id="63" name="Shape 63"/>
-            <p:cNvSpPr/>
-            <p:nvPr/>
-          </p:nvSpPr>
-          <p:spPr>
-            <a:xfrm>
-              <a:off x="6795900" y="2673600"/>
-              <a:ext cx="102300" cy="22550"/>
-            </a:xfrm>
-            <a:custGeom>
-              <a:avLst/>
-              <a:gdLst/>
-              <a:ahLst/>
-              <a:cxnLst/>
-              <a:rect l="0" t="0" r="0" b="0"/>
-              <a:pathLst>
-                <a:path w="4092" h="902" fill="none" extrusionOk="0">
-                  <a:moveTo>
-                    <a:pt x="4092" y="902"/>
-                  </a:moveTo>
-                  <a:lnTo>
-                    <a:pt x="4092" y="1"/>
-                  </a:lnTo>
-                  <a:lnTo>
-                    <a:pt x="0" y="1"/>
-                  </a:lnTo>
-                  <a:lnTo>
-                    <a:pt x="0" y="902"/>
-                  </a:lnTo>
-                  <a:lnTo>
-                    <a:pt x="4092" y="902"/>
-                  </a:lnTo>
-                  <a:close/>
-                </a:path>
-              </a:pathLst>
-            </a:custGeom>
-            <a:noFill/>
-            <a:ln w="9525" cap="rnd" cmpd="sng">
-              <a:solidFill>
-                <a:srgbClr val="000000"/>
-              </a:solidFill>
-              <a:prstDash val="solid"/>
-              <a:round/>
-              <a:headEnd type="none" w="med" len="med"/>
-              <a:tailEnd type="none" w="med" len="med"/>
-            </a:ln>
-          </p:spPr>
-          <p:txBody>
-            <a:bodyPr wrap="square" lIns="91425" tIns="91425" rIns="91425" bIns="91425" anchor="ctr" anchorCtr="0">
-              <a:noAutofit/>
-            </a:bodyPr>
-            <a:lstStyle/>
-            <a:p>
-              <a:pPr lvl="0">
-                <a:spcBef>
-                  <a:spcPts val="0"/>
-                </a:spcBef>
-                <a:buNone/>
-              </a:pPr>
-              <a:endParaRPr/>
-            </a:p>
-          </p:txBody>
-        </p:sp>
-        <p:sp>
-          <p:nvSpPr>
-            <p:cNvPr id="64" name="Shape 64"/>
-            <p:cNvSpPr/>
-            <p:nvPr/>
-          </p:nvSpPr>
-          <p:spPr>
-            <a:xfrm>
-              <a:off x="6795900" y="2650475"/>
-              <a:ext cx="102300" cy="22550"/>
-            </a:xfrm>
-            <a:custGeom>
-              <a:avLst/>
-              <a:gdLst/>
-              <a:ahLst/>
-              <a:cxnLst/>
-              <a:rect l="0" t="0" r="0" b="0"/>
-              <a:pathLst>
-                <a:path w="4092" h="902" fill="none" extrusionOk="0">
-                  <a:moveTo>
-                    <a:pt x="4092" y="901"/>
-                  </a:moveTo>
-                  <a:lnTo>
-                    <a:pt x="4092" y="0"/>
-                  </a:lnTo>
-                  <a:lnTo>
-                    <a:pt x="0" y="0"/>
-                  </a:lnTo>
-                  <a:lnTo>
-                    <a:pt x="0" y="901"/>
-                  </a:lnTo>
-                  <a:lnTo>
-                    <a:pt x="4092" y="901"/>
-                  </a:lnTo>
-                  <a:close/>
-                </a:path>
-              </a:pathLst>
-            </a:custGeom>
-            <a:noFill/>
-            <a:ln w="9525" cap="rnd" cmpd="sng">
-              <a:solidFill>
-                <a:srgbClr val="000000"/>
-              </a:solidFill>
-              <a:prstDash val="solid"/>
-              <a:round/>
-              <a:headEnd type="none" w="med" len="med"/>
-              <a:tailEnd type="none" w="med" len="med"/>
-            </a:ln>
-          </p:spPr>
-          <p:txBody>
-            <a:bodyPr wrap="square" lIns="91425" tIns="91425" rIns="91425" bIns="91425" anchor="ctr" anchorCtr="0">
-              <a:noAutofit/>
-            </a:bodyPr>
-            <a:lstStyle/>
-            <a:p>
-              <a:pPr lvl="0">
-                <a:spcBef>
-                  <a:spcPts val="0"/>
-                </a:spcBef>
-                <a:buNone/>
-              </a:pPr>
-              <a:endParaRPr/>
-            </a:p>
-          </p:txBody>
-        </p:sp>
-        <p:sp>
-          <p:nvSpPr>
-            <p:cNvPr id="65" name="Shape 65"/>
-            <p:cNvSpPr/>
-            <p:nvPr/>
-          </p:nvSpPr>
-          <p:spPr>
-            <a:xfrm>
-              <a:off x="6795900" y="2696125"/>
-              <a:ext cx="102300" cy="29875"/>
-            </a:xfrm>
-            <a:custGeom>
-              <a:avLst/>
-              <a:gdLst/>
-              <a:ahLst/>
-              <a:cxnLst/>
-              <a:rect l="0" t="0" r="0" b="0"/>
-              <a:pathLst>
-                <a:path w="4092" h="1195" fill="none" extrusionOk="0">
-                  <a:moveTo>
-                    <a:pt x="0" y="1"/>
-                  </a:moveTo>
-                  <a:lnTo>
-                    <a:pt x="0" y="171"/>
-                  </a:lnTo>
-                  <a:lnTo>
-                    <a:pt x="0" y="171"/>
-                  </a:lnTo>
-                  <a:lnTo>
-                    <a:pt x="24" y="318"/>
-                  </a:lnTo>
-                  <a:lnTo>
-                    <a:pt x="98" y="464"/>
-                  </a:lnTo>
-                  <a:lnTo>
-                    <a:pt x="195" y="585"/>
-                  </a:lnTo>
-                  <a:lnTo>
-                    <a:pt x="341" y="659"/>
-                  </a:lnTo>
-                  <a:lnTo>
-                    <a:pt x="1875" y="1170"/>
-                  </a:lnTo>
-                  <a:lnTo>
-                    <a:pt x="1875" y="1170"/>
-                  </a:lnTo>
-                  <a:lnTo>
-                    <a:pt x="2046" y="1194"/>
-                  </a:lnTo>
-                  <a:lnTo>
-                    <a:pt x="2046" y="1194"/>
-                  </a:lnTo>
-                  <a:lnTo>
-                    <a:pt x="2216" y="1170"/>
-                  </a:lnTo>
-                  <a:lnTo>
-                    <a:pt x="3751" y="659"/>
-                  </a:lnTo>
-                  <a:lnTo>
-                    <a:pt x="3751" y="659"/>
-                  </a:lnTo>
-                  <a:lnTo>
-                    <a:pt x="3897" y="585"/>
-                  </a:lnTo>
-                  <a:lnTo>
-                    <a:pt x="3994" y="464"/>
-                  </a:lnTo>
-                  <a:lnTo>
-                    <a:pt x="4067" y="318"/>
-                  </a:lnTo>
-                  <a:lnTo>
-                    <a:pt x="4092" y="171"/>
-                  </a:lnTo>
-                  <a:lnTo>
-                    <a:pt x="4092" y="1"/>
-                  </a:lnTo>
-                  <a:lnTo>
-                    <a:pt x="0" y="1"/>
-                  </a:lnTo>
-                  <a:close/>
-                </a:path>
-              </a:pathLst>
-            </a:custGeom>
-            <a:noFill/>
-            <a:ln w="9525" cap="rnd" cmpd="sng">
-              <a:solidFill>
-                <a:srgbClr val="000000"/>
-              </a:solidFill>
-              <a:prstDash val="solid"/>
-              <a:round/>
-              <a:headEnd type="none" w="med" len="med"/>
-              <a:tailEnd type="none" w="med" len="med"/>
-            </a:ln>
-          </p:spPr>
-          <p:txBody>
-            <a:bodyPr wrap="square" lIns="91425" tIns="91425" rIns="91425" bIns="91425" anchor="ctr" anchorCtr="0">
-              <a:noAutofit/>
-            </a:bodyPr>
-            <a:lstStyle/>
-            <a:p>
-              <a:pPr lvl="0">
-                <a:spcBef>
-                  <a:spcPts val="0"/>
-                </a:spcBef>
-                <a:buNone/>
-              </a:pPr>
-              <a:endParaRPr/>
-            </a:p>
-          </p:txBody>
-        </p:sp>
-        <p:sp>
-          <p:nvSpPr>
-            <p:cNvPr id="66" name="Shape 66"/>
-            <p:cNvSpPr/>
-            <p:nvPr/>
-          </p:nvSpPr>
-          <p:spPr>
-            <a:xfrm>
-              <a:off x="6784925" y="2459275"/>
-              <a:ext cx="35350" cy="166875"/>
-            </a:xfrm>
-            <a:custGeom>
-              <a:avLst/>
-              <a:gdLst/>
-              <a:ahLst/>
-              <a:cxnLst/>
-              <a:rect l="0" t="0" r="0" b="0"/>
-              <a:pathLst>
-                <a:path w="1414" h="6675" fill="none" extrusionOk="0">
-                  <a:moveTo>
-                    <a:pt x="1413" y="6674"/>
-                  </a:moveTo>
-                  <a:lnTo>
-                    <a:pt x="1413" y="6674"/>
-                  </a:lnTo>
-                  <a:lnTo>
-                    <a:pt x="585" y="2850"/>
-                  </a:lnTo>
-                  <a:lnTo>
-                    <a:pt x="1" y="1"/>
-                  </a:lnTo>
-                </a:path>
-              </a:pathLst>
-            </a:custGeom>
-            <a:noFill/>
-            <a:ln w="9525" cap="rnd" cmpd="sng">
-              <a:solidFill>
-                <a:srgbClr val="000000"/>
-              </a:solidFill>
-              <a:prstDash val="solid"/>
-              <a:round/>
-              <a:headEnd type="none" w="med" len="med"/>
-              <a:tailEnd type="none" w="med" len="med"/>
-            </a:ln>
-          </p:spPr>
-          <p:txBody>
-            <a:bodyPr wrap="square" lIns="91425" tIns="91425" rIns="91425" bIns="91425" anchor="ctr" anchorCtr="0">
-              <a:noAutofit/>
-            </a:bodyPr>
-            <a:lstStyle/>
-            <a:p>
-              <a:pPr lvl="0">
-                <a:spcBef>
-                  <a:spcPts val="0"/>
-                </a:spcBef>
-                <a:buNone/>
-              </a:pPr>
-              <a:endParaRPr/>
-            </a:p>
-          </p:txBody>
-        </p:sp>
-        <p:sp>
-          <p:nvSpPr>
-            <p:cNvPr id="67" name="Shape 67"/>
-            <p:cNvSpPr/>
-            <p:nvPr/>
-          </p:nvSpPr>
-          <p:spPr>
-            <a:xfrm>
-              <a:off x="6718575" y="2318625"/>
-              <a:ext cx="256950" cy="307525"/>
-            </a:xfrm>
-            <a:custGeom>
-              <a:avLst/>
-              <a:gdLst/>
-              <a:ahLst/>
-              <a:cxnLst/>
-              <a:rect l="0" t="0" r="0" b="0"/>
-              <a:pathLst>
-                <a:path w="10278" h="12301" fill="none" extrusionOk="0">
-                  <a:moveTo>
-                    <a:pt x="7185" y="12300"/>
-                  </a:moveTo>
-                  <a:lnTo>
-                    <a:pt x="7185" y="12300"/>
-                  </a:lnTo>
-                  <a:lnTo>
-                    <a:pt x="7307" y="11764"/>
-                  </a:lnTo>
-                  <a:lnTo>
-                    <a:pt x="7477" y="11253"/>
-                  </a:lnTo>
-                  <a:lnTo>
-                    <a:pt x="7672" y="10766"/>
-                  </a:lnTo>
-                  <a:lnTo>
-                    <a:pt x="7891" y="10327"/>
-                  </a:lnTo>
-                  <a:lnTo>
-                    <a:pt x="8135" y="9913"/>
-                  </a:lnTo>
-                  <a:lnTo>
-                    <a:pt x="8378" y="9499"/>
-                  </a:lnTo>
-                  <a:lnTo>
-                    <a:pt x="8914" y="8720"/>
-                  </a:lnTo>
-                  <a:lnTo>
-                    <a:pt x="9182" y="8330"/>
-                  </a:lnTo>
-                  <a:lnTo>
-                    <a:pt x="9425" y="7941"/>
-                  </a:lnTo>
-                  <a:lnTo>
-                    <a:pt x="9645" y="7551"/>
-                  </a:lnTo>
-                  <a:lnTo>
-                    <a:pt x="9864" y="7113"/>
-                  </a:lnTo>
-                  <a:lnTo>
-                    <a:pt x="10034" y="6674"/>
-                  </a:lnTo>
-                  <a:lnTo>
-                    <a:pt x="10156" y="6187"/>
-                  </a:lnTo>
-                  <a:lnTo>
-                    <a:pt x="10229" y="5676"/>
-                  </a:lnTo>
-                  <a:lnTo>
-                    <a:pt x="10253" y="5408"/>
-                  </a:lnTo>
-                  <a:lnTo>
-                    <a:pt x="10278" y="5140"/>
-                  </a:lnTo>
-                  <a:lnTo>
-                    <a:pt x="10278" y="5140"/>
-                  </a:lnTo>
-                  <a:lnTo>
-                    <a:pt x="10229" y="4604"/>
-                  </a:lnTo>
-                  <a:lnTo>
-                    <a:pt x="10156" y="4093"/>
-                  </a:lnTo>
-                  <a:lnTo>
-                    <a:pt x="10034" y="3605"/>
-                  </a:lnTo>
-                  <a:lnTo>
-                    <a:pt x="9864" y="3143"/>
-                  </a:lnTo>
-                  <a:lnTo>
-                    <a:pt x="9645" y="2680"/>
-                  </a:lnTo>
-                  <a:lnTo>
-                    <a:pt x="9401" y="2266"/>
-                  </a:lnTo>
-                  <a:lnTo>
-                    <a:pt x="9084" y="1876"/>
-                  </a:lnTo>
-                  <a:lnTo>
-                    <a:pt x="8768" y="1511"/>
-                  </a:lnTo>
-                  <a:lnTo>
-                    <a:pt x="8402" y="1170"/>
-                  </a:lnTo>
-                  <a:lnTo>
-                    <a:pt x="8013" y="878"/>
-                  </a:lnTo>
-                  <a:lnTo>
-                    <a:pt x="7574" y="634"/>
-                  </a:lnTo>
-                  <a:lnTo>
-                    <a:pt x="7136" y="415"/>
-                  </a:lnTo>
-                  <a:lnTo>
-                    <a:pt x="6673" y="244"/>
-                  </a:lnTo>
-                  <a:lnTo>
-                    <a:pt x="6162" y="98"/>
-                  </a:lnTo>
-                  <a:lnTo>
-                    <a:pt x="5675" y="25"/>
-                  </a:lnTo>
-                  <a:lnTo>
-                    <a:pt x="5139" y="1"/>
-                  </a:lnTo>
-                  <a:lnTo>
-                    <a:pt x="5139" y="1"/>
-                  </a:lnTo>
-                  <a:lnTo>
-                    <a:pt x="4603" y="25"/>
-                  </a:lnTo>
-                  <a:lnTo>
-                    <a:pt x="4116" y="98"/>
-                  </a:lnTo>
-                  <a:lnTo>
-                    <a:pt x="3605" y="244"/>
-                  </a:lnTo>
-                  <a:lnTo>
-                    <a:pt x="3142" y="415"/>
-                  </a:lnTo>
-                  <a:lnTo>
-                    <a:pt x="2703" y="634"/>
-                  </a:lnTo>
-                  <a:lnTo>
-                    <a:pt x="2265" y="878"/>
-                  </a:lnTo>
-                  <a:lnTo>
-                    <a:pt x="1875" y="1170"/>
-                  </a:lnTo>
-                  <a:lnTo>
-                    <a:pt x="1510" y="1511"/>
-                  </a:lnTo>
-                  <a:lnTo>
-                    <a:pt x="1193" y="1876"/>
-                  </a:lnTo>
-                  <a:lnTo>
-                    <a:pt x="877" y="2266"/>
-                  </a:lnTo>
-                  <a:lnTo>
-                    <a:pt x="633" y="2680"/>
-                  </a:lnTo>
-                  <a:lnTo>
-                    <a:pt x="414" y="3143"/>
-                  </a:lnTo>
-                  <a:lnTo>
-                    <a:pt x="244" y="3605"/>
-                  </a:lnTo>
-                  <a:lnTo>
-                    <a:pt x="122" y="4093"/>
-                  </a:lnTo>
-                  <a:lnTo>
-                    <a:pt x="49" y="4604"/>
-                  </a:lnTo>
-                  <a:lnTo>
-                    <a:pt x="0" y="5140"/>
-                  </a:lnTo>
-                  <a:lnTo>
-                    <a:pt x="0" y="5140"/>
-                  </a:lnTo>
-                  <a:lnTo>
-                    <a:pt x="24" y="5408"/>
-                  </a:lnTo>
-                  <a:lnTo>
-                    <a:pt x="49" y="5676"/>
-                  </a:lnTo>
-                  <a:lnTo>
-                    <a:pt x="122" y="6187"/>
-                  </a:lnTo>
-                  <a:lnTo>
-                    <a:pt x="244" y="6674"/>
-                  </a:lnTo>
-                  <a:lnTo>
-                    <a:pt x="414" y="7113"/>
-                  </a:lnTo>
-                  <a:lnTo>
-                    <a:pt x="633" y="7551"/>
-                  </a:lnTo>
-                  <a:lnTo>
-                    <a:pt x="852" y="7941"/>
-                  </a:lnTo>
-                  <a:lnTo>
-                    <a:pt x="1096" y="8330"/>
-                  </a:lnTo>
-                  <a:lnTo>
-                    <a:pt x="1364" y="8720"/>
-                  </a:lnTo>
-                  <a:lnTo>
-                    <a:pt x="1900" y="9499"/>
-                  </a:lnTo>
-                  <a:lnTo>
-                    <a:pt x="2143" y="9913"/>
-                  </a:lnTo>
-                  <a:lnTo>
-                    <a:pt x="2387" y="10327"/>
-                  </a:lnTo>
-                  <a:lnTo>
-                    <a:pt x="2606" y="10766"/>
-                  </a:lnTo>
-                  <a:lnTo>
-                    <a:pt x="2801" y="11253"/>
-                  </a:lnTo>
-                  <a:lnTo>
-                    <a:pt x="2971" y="11764"/>
-                  </a:lnTo>
-                  <a:lnTo>
-                    <a:pt x="3093" y="12300"/>
-                  </a:lnTo>
-                </a:path>
-              </a:pathLst>
-            </a:custGeom>
-            <a:noFill/>
-            <a:ln w="9525" cap="rnd" cmpd="sng">
-              <a:solidFill>
-                <a:srgbClr val="000000"/>
-              </a:solidFill>
-              <a:prstDash val="solid"/>
-              <a:round/>
-              <a:headEnd type="none" w="med" len="med"/>
-              <a:tailEnd type="none" w="med" len="med"/>
-            </a:ln>
-          </p:spPr>
-          <p:txBody>
-            <a:bodyPr wrap="square" lIns="91425" tIns="91425" rIns="91425" bIns="91425" anchor="ctr" anchorCtr="0">
-              <a:noAutofit/>
-            </a:bodyPr>
-            <a:lstStyle/>
-            <a:p>
-              <a:pPr lvl="0">
-                <a:spcBef>
-                  <a:spcPts val="0"/>
-                </a:spcBef>
-                <a:buNone/>
-              </a:pPr>
-              <a:endParaRPr/>
-            </a:p>
-          </p:txBody>
-        </p:sp>
-        <p:sp>
-          <p:nvSpPr>
-            <p:cNvPr id="68" name="Shape 68"/>
-            <p:cNvSpPr/>
-            <p:nvPr/>
-          </p:nvSpPr>
-          <p:spPr>
-            <a:xfrm>
-              <a:off x="6873825" y="2459275"/>
-              <a:ext cx="35350" cy="166875"/>
-            </a:xfrm>
-            <a:custGeom>
-              <a:avLst/>
-              <a:gdLst/>
-              <a:ahLst/>
-              <a:cxnLst/>
-              <a:rect l="0" t="0" r="0" b="0"/>
-              <a:pathLst>
-                <a:path w="1414" h="6675" fill="none" extrusionOk="0">
-                  <a:moveTo>
-                    <a:pt x="1413" y="1"/>
-                  </a:moveTo>
-                  <a:lnTo>
-                    <a:pt x="1413" y="1"/>
-                  </a:lnTo>
-                  <a:lnTo>
-                    <a:pt x="829" y="2850"/>
-                  </a:lnTo>
-                  <a:lnTo>
-                    <a:pt x="1" y="6674"/>
-                  </a:lnTo>
-                </a:path>
-              </a:pathLst>
-            </a:custGeom>
-            <a:noFill/>
-            <a:ln w="9525" cap="rnd" cmpd="sng">
-              <a:solidFill>
-                <a:srgbClr val="000000"/>
-              </a:solidFill>
-              <a:prstDash val="solid"/>
-              <a:round/>
-              <a:headEnd type="none" w="med" len="med"/>
-              <a:tailEnd type="none" w="med" len="med"/>
-            </a:ln>
-          </p:spPr>
-          <p:txBody>
-            <a:bodyPr wrap="square" lIns="91425" tIns="91425" rIns="91425" bIns="91425" anchor="ctr" anchorCtr="0">
-              <a:noAutofit/>
-            </a:bodyPr>
-            <a:lstStyle/>
-            <a:p>
-              <a:pPr lvl="0">
-                <a:spcBef>
-                  <a:spcPts val="0"/>
-                </a:spcBef>
-                <a:buNone/>
-              </a:pPr>
-              <a:endParaRPr/>
-            </a:p>
-          </p:txBody>
-        </p:sp>
-        <p:sp>
-          <p:nvSpPr>
-            <p:cNvPr id="69" name="Shape 69"/>
-            <p:cNvSpPr/>
-            <p:nvPr/>
-          </p:nvSpPr>
-          <p:spPr>
-            <a:xfrm>
-              <a:off x="6801975" y="2453200"/>
-              <a:ext cx="90150" cy="19500"/>
-            </a:xfrm>
-            <a:custGeom>
-              <a:avLst/>
-              <a:gdLst/>
-              <a:ahLst/>
-              <a:cxnLst/>
-              <a:rect l="0" t="0" r="0" b="0"/>
-              <a:pathLst>
-                <a:path w="3606" h="780" fill="none" extrusionOk="0">
-                  <a:moveTo>
-                    <a:pt x="1" y="73"/>
-                  </a:moveTo>
-                  <a:lnTo>
-                    <a:pt x="829" y="780"/>
-                  </a:lnTo>
-                  <a:lnTo>
-                    <a:pt x="1657" y="73"/>
-                  </a:lnTo>
-                  <a:lnTo>
-                    <a:pt x="1657" y="73"/>
-                  </a:lnTo>
-                  <a:lnTo>
-                    <a:pt x="1730" y="25"/>
-                  </a:lnTo>
-                  <a:lnTo>
-                    <a:pt x="1803" y="0"/>
-                  </a:lnTo>
-                  <a:lnTo>
-                    <a:pt x="1876" y="25"/>
-                  </a:lnTo>
-                  <a:lnTo>
-                    <a:pt x="1949" y="73"/>
-                  </a:lnTo>
-                  <a:lnTo>
-                    <a:pt x="2777" y="780"/>
-                  </a:lnTo>
-                  <a:lnTo>
-                    <a:pt x="3605" y="73"/>
-                  </a:lnTo>
-                </a:path>
-              </a:pathLst>
-            </a:custGeom>
-            <a:noFill/>
-            <a:ln w="9525" cap="rnd" cmpd="sng">
-              <a:solidFill>
-                <a:srgbClr val="000000"/>
-              </a:solidFill>
-              <a:prstDash val="solid"/>
-              <a:round/>
-              <a:headEnd type="none" w="med" len="med"/>
-              <a:tailEnd type="none" w="med" len="med"/>
-            </a:ln>
-          </p:spPr>
-          <p:txBody>
-            <a:bodyPr wrap="square" lIns="91425" tIns="91425" rIns="91425" bIns="91425" anchor="ctr" anchorCtr="0">
-              <a:noAutofit/>
-            </a:bodyPr>
-            <a:lstStyle/>
-            <a:p>
-              <a:pPr lvl="0">
-                <a:spcBef>
-                  <a:spcPts val="0"/>
-                </a:spcBef>
-                <a:buNone/>
-              </a:pPr>
-              <a:endParaRPr/>
-            </a:p>
-          </p:txBody>
-        </p:sp>
-        <p:sp>
-          <p:nvSpPr>
-            <p:cNvPr id="70" name="Shape 70"/>
-            <p:cNvSpPr/>
-            <p:nvPr/>
-          </p:nvSpPr>
-          <p:spPr>
-            <a:xfrm>
-              <a:off x="6795900" y="2628550"/>
-              <a:ext cx="102300" cy="25"/>
-            </a:xfrm>
-            <a:custGeom>
-              <a:avLst/>
-              <a:gdLst/>
-              <a:ahLst/>
-              <a:cxnLst/>
-              <a:rect l="0" t="0" r="0" b="0"/>
-              <a:pathLst>
-                <a:path w="4092" h="1" fill="none" extrusionOk="0">
-                  <a:moveTo>
-                    <a:pt x="0" y="1"/>
-                  </a:moveTo>
-                  <a:lnTo>
-                    <a:pt x="4092" y="1"/>
-                  </a:lnTo>
-                </a:path>
-              </a:pathLst>
-            </a:custGeom>
-            <a:noFill/>
-            <a:ln w="9525" cap="rnd" cmpd="sng">
-              <a:solidFill>
-                <a:srgbClr val="000000"/>
-              </a:solidFill>
-              <a:prstDash val="solid"/>
-              <a:round/>
-              <a:headEnd type="none" w="med" len="med"/>
-              <a:tailEnd type="none" w="med" len="med"/>
-            </a:ln>
-          </p:spPr>
-          <p:txBody>
-            <a:bodyPr wrap="square" lIns="91425" tIns="91425" rIns="91425" bIns="91425" anchor="ctr" anchorCtr="0">
-              <a:noAutofit/>
-            </a:bodyPr>
-            <a:lstStyle/>
-            <a:p>
-              <a:pPr lvl="0">
-                <a:spcBef>
-                  <a:spcPts val="0"/>
-                </a:spcBef>
-                <a:buNone/>
-              </a:pPr>
-              <a:endParaRPr/>
-            </a:p>
-          </p:txBody>
-        </p:sp>
-      </p:grpSp>
-    </p:spTree>
-  </p:cSld>
-  <p:clrMapOvr>
-    <a:masterClrMapping/>
-  </p:clrMapOvr>
-  <p:timing>
-    <p:tnLst>
-      <p:par>
-        <p:cTn id="1" dur="indefinite" restart="never" nodeType="tmRoot"/>
-      </p:par>
-    </p:tnLst>
-  </p:timing>
-</p:sld>
-</file>
-
-<file path=ppt/slides/slide2.xml><?xml version="1.0" encoding="utf-8"?>
-<p:sld xmlns:a="http://schemas.openxmlformats.org/drawingml/2006/main" xmlns:r="http://schemas.openxmlformats.org/officeDocument/2006/relationships" xmlns:p="http://schemas.openxmlformats.org/presentationml/2006/main">
-  <p:cSld>
-    <p:spTree>
-      <p:nvGrpSpPr>
-        <p:cNvPr id="1" name="Shape 109"/>
-        <p:cNvGrpSpPr/>
-        <p:nvPr/>
-      </p:nvGrpSpPr>
-      <p:grpSpPr>
-        <a:xfrm>
-          <a:off x="0" y="0"/>
-          <a:ext cx="0" cy="0"/>
-          <a:chOff x="0" y="0"/>
-          <a:chExt cx="0" cy="0"/>
-        </a:xfrm>
-      </p:grpSpPr>
-      <p:sp>
-        <p:nvSpPr>
-          <p:cNvPr id="2" name="Title 1"/>
-          <p:cNvSpPr>
-            <a:spLocks noGrp="1"/>
-          </p:cNvSpPr>
-          <p:nvPr>
-            <p:ph type="title"/>
-          </p:nvPr>
-        </p:nvSpPr>
-        <p:spPr>
-          <a:solidFill>
-            <a:schemeClr val="lt1"/>
-          </a:solidFill>
-          <a:ln>
-            <a:solidFill>
-              <a:srgbClr val="CCCCCC"/>
-            </a:solidFill>
-          </a:ln>
-        </p:spPr>
-        <p:txBody>
-          <a:bodyPr/>
-          <a:lstStyle/>
-          <a:p>
-            <a:r>
-              <a:rPr lang="en-US" dirty="0" smtClean="0"/>
-              <a:t>Introduction</a:t>
-            </a:r>
-            <a:endParaRPr lang="en-US" dirty="0"/>
-          </a:p>
-        </p:txBody>
-      </p:sp>
-      <p:sp>
-        <p:nvSpPr>
-          <p:cNvPr id="3" name="Text Placeholder 2"/>
-          <p:cNvSpPr>
-            <a:spLocks noGrp="1"/>
-          </p:cNvSpPr>
-          <p:nvPr>
-            <p:ph type="body" idx="1"/>
-          </p:nvPr>
-        </p:nvSpPr>
-        <p:spPr/>
-        <p:txBody>
-          <a:bodyPr/>
-          <a:lstStyle/>
-          <a:p>
-            <a:endParaRPr lang="en-US"/>
+            <a:endParaRPr lang="en" sz="3200" dirty="0"/>
           </a:p>
         </p:txBody>
       </p:sp>
@@ -4540,7 +2933,7 @@
 </p:sld>
 </file>
 
-<file path=ppt/slides/slide3.xml><?xml version="1.0" encoding="utf-8"?>
+<file path=ppt/slides/slide2.xml><?xml version="1.0" encoding="utf-8"?>
 <p:sld xmlns:a="http://schemas.openxmlformats.org/drawingml/2006/main" xmlns:r="http://schemas.openxmlformats.org/officeDocument/2006/relationships" xmlns:p="http://schemas.openxmlformats.org/presentationml/2006/main">
   <p:cSld>
     <p:spTree>
@@ -4564,10 +2957,15 @@
             <a:spLocks noGrp="1"/>
           </p:cNvSpPr>
           <p:nvPr>
-            <p:ph type="title"/>
+            <p:ph type="title" idx="4294967295"/>
           </p:nvPr>
         </p:nvSpPr>
-        <p:spPr/>
+        <p:spPr>
+          <a:xfrm>
+            <a:off x="289932" y="67959"/>
+            <a:ext cx="7181385" cy="620239"/>
+          </a:xfrm>
+        </p:spPr>
         <p:txBody>
           <a:bodyPr/>
           <a:lstStyle/>
@@ -4591,7 +2989,7 @@
           <a:bodyPr/>
           <a:lstStyle/>
           <a:p>
-            <a:endParaRPr lang="en-US"/>
+            <a:endParaRPr lang="en-US" dirty="0"/>
           </a:p>
         </p:txBody>
       </p:sp>
@@ -5175,4 +3573,265 @@
   <a:objectDefaults/>
   <a:extraClrSchemeLst/>
 </a:theme>
+</file>
+
+<file path=ppt/theme/theme3.xml><?xml version="1.0" encoding="utf-8"?>
+<a:theme xmlns:a="http://schemas.openxmlformats.org/drawingml/2006/main" name="Office Theme">
+  <a:themeElements>
+    <a:clrScheme name="Office">
+      <a:dk1>
+        <a:sysClr val="windowText" lastClr="000000"/>
+      </a:dk1>
+      <a:lt1>
+        <a:sysClr val="window" lastClr="FFFFFF"/>
+      </a:lt1>
+      <a:dk2>
+        <a:srgbClr val="44546A"/>
+      </a:dk2>
+      <a:lt2>
+        <a:srgbClr val="E7E6E6"/>
+      </a:lt2>
+      <a:accent1>
+        <a:srgbClr val="4472C4"/>
+      </a:accent1>
+      <a:accent2>
+        <a:srgbClr val="ED7D31"/>
+      </a:accent2>
+      <a:accent3>
+        <a:srgbClr val="A5A5A5"/>
+      </a:accent3>
+      <a:accent4>
+        <a:srgbClr val="FFC000"/>
+      </a:accent4>
+      <a:accent5>
+        <a:srgbClr val="5B9BD5"/>
+      </a:accent5>
+      <a:accent6>
+        <a:srgbClr val="70AD47"/>
+      </a:accent6>
+      <a:hlink>
+        <a:srgbClr val="0563C1"/>
+      </a:hlink>
+      <a:folHlink>
+        <a:srgbClr val="954F72"/>
+      </a:folHlink>
+    </a:clrScheme>
+    <a:fontScheme name="Office">
+      <a:majorFont>
+        <a:latin typeface="Calibri Light" panose="020F0302020204030204"/>
+        <a:ea typeface=""/>
+        <a:cs typeface=""/>
+        <a:font script="Jpan" typeface="Yu Gothic Light"/>
+        <a:font script="Hang" typeface="맑은 고딕"/>
+        <a:font script="Hans" typeface="DengXian Light"/>
+        <a:font script="Hant" typeface="新細明體"/>
+        <a:font script="Arab" typeface="Times New Roman"/>
+        <a:font script="Hebr" typeface="Times New Roman"/>
+        <a:font script="Thai" typeface="Angsana New"/>
+        <a:font script="Ethi" typeface="Nyala"/>
+        <a:font script="Beng" typeface="Vrinda"/>
+        <a:font script="Gujr" typeface="Shruti"/>
+        <a:font script="Khmr" typeface="MoolBoran"/>
+        <a:font script="Knda" typeface="Tunga"/>
+        <a:font script="Guru" typeface="Raavi"/>
+        <a:font script="Cans" typeface="Euphemia"/>
+        <a:font script="Cher" typeface="Plantagenet Cherokee"/>
+        <a:font script="Yiii" typeface="Microsoft Yi Baiti"/>
+        <a:font script="Tibt" typeface="Microsoft Himalaya"/>
+        <a:font script="Thaa" typeface="MV Boli"/>
+        <a:font script="Deva" typeface="Mangal"/>
+        <a:font script="Telu" typeface="Gautami"/>
+        <a:font script="Taml" typeface="Latha"/>
+        <a:font script="Syrc" typeface="Estrangelo Edessa"/>
+        <a:font script="Orya" typeface="Kalinga"/>
+        <a:font script="Mlym" typeface="Kartika"/>
+        <a:font script="Laoo" typeface="DokChampa"/>
+        <a:font script="Sinh" typeface="Iskoola Pota"/>
+        <a:font script="Mong" typeface="Mongolian Baiti"/>
+        <a:font script="Viet" typeface="Times New Roman"/>
+        <a:font script="Uigh" typeface="Microsoft Uighur"/>
+        <a:font script="Geor" typeface="Sylfaen"/>
+      </a:majorFont>
+      <a:minorFont>
+        <a:latin typeface="Calibri" panose="020F0502020204030204"/>
+        <a:ea typeface=""/>
+        <a:cs typeface=""/>
+        <a:font script="Jpan" typeface="Yu Gothic"/>
+        <a:font script="Hang" typeface="맑은 고딕"/>
+        <a:font script="Hans" typeface="DengXian"/>
+        <a:font script="Hant" typeface="新細明體"/>
+        <a:font script="Arab" typeface="Arial"/>
+        <a:font script="Hebr" typeface="Arial"/>
+        <a:font script="Thai" typeface="Cordia New"/>
+        <a:font script="Ethi" typeface="Nyala"/>
+        <a:font script="Beng" typeface="Vrinda"/>
+        <a:font script="Gujr" typeface="Shruti"/>
+        <a:font script="Khmr" typeface="DaunPenh"/>
+        <a:font script="Knda" typeface="Tunga"/>
+        <a:font script="Guru" typeface="Raavi"/>
+        <a:font script="Cans" typeface="Euphemia"/>
+        <a:font script="Cher" typeface="Plantagenet Cherokee"/>
+        <a:font script="Yiii" typeface="Microsoft Yi Baiti"/>
+        <a:font script="Tibt" typeface="Microsoft Himalaya"/>
+        <a:font script="Thaa" typeface="MV Boli"/>
+        <a:font script="Deva" typeface="Mangal"/>
+        <a:font script="Telu" typeface="Gautami"/>
+        <a:font script="Taml" typeface="Latha"/>
+        <a:font script="Syrc" typeface="Estrangelo Edessa"/>
+        <a:font script="Orya" typeface="Kalinga"/>
+        <a:font script="Mlym" typeface="Kartika"/>
+        <a:font script="Laoo" typeface="DokChampa"/>
+        <a:font script="Sinh" typeface="Iskoola Pota"/>
+        <a:font script="Mong" typeface="Mongolian Baiti"/>
+        <a:font script="Viet" typeface="Arial"/>
+        <a:font script="Uigh" typeface="Microsoft Uighur"/>
+        <a:font script="Geor" typeface="Sylfaen"/>
+      </a:minorFont>
+    </a:fontScheme>
+    <a:fmtScheme name="Office">
+      <a:fillStyleLst>
+        <a:solidFill>
+          <a:schemeClr val="phClr"/>
+        </a:solidFill>
+        <a:gradFill rotWithShape="1">
+          <a:gsLst>
+            <a:gs pos="0">
+              <a:schemeClr val="phClr">
+                <a:lumMod val="110000"/>
+                <a:satMod val="105000"/>
+                <a:tint val="67000"/>
+              </a:schemeClr>
+            </a:gs>
+            <a:gs pos="50000">
+              <a:schemeClr val="phClr">
+                <a:lumMod val="105000"/>
+                <a:satMod val="103000"/>
+                <a:tint val="73000"/>
+              </a:schemeClr>
+            </a:gs>
+            <a:gs pos="100000">
+              <a:schemeClr val="phClr">
+                <a:lumMod val="105000"/>
+                <a:satMod val="109000"/>
+                <a:tint val="81000"/>
+              </a:schemeClr>
+            </a:gs>
+          </a:gsLst>
+          <a:lin ang="5400000" scaled="0"/>
+        </a:gradFill>
+        <a:gradFill rotWithShape="1">
+          <a:gsLst>
+            <a:gs pos="0">
+              <a:schemeClr val="phClr">
+                <a:satMod val="103000"/>
+                <a:lumMod val="102000"/>
+                <a:tint val="94000"/>
+              </a:schemeClr>
+            </a:gs>
+            <a:gs pos="50000">
+              <a:schemeClr val="phClr">
+                <a:satMod val="110000"/>
+                <a:lumMod val="100000"/>
+                <a:shade val="100000"/>
+              </a:schemeClr>
+            </a:gs>
+            <a:gs pos="100000">
+              <a:schemeClr val="phClr">
+                <a:lumMod val="99000"/>
+                <a:satMod val="120000"/>
+                <a:shade val="78000"/>
+              </a:schemeClr>
+            </a:gs>
+          </a:gsLst>
+          <a:lin ang="5400000" scaled="0"/>
+        </a:gradFill>
+      </a:fillStyleLst>
+      <a:lnStyleLst>
+        <a:ln w="6350" cap="flat" cmpd="sng" algn="ctr">
+          <a:solidFill>
+            <a:schemeClr val="phClr"/>
+          </a:solidFill>
+          <a:prstDash val="solid"/>
+          <a:miter lim="800000"/>
+        </a:ln>
+        <a:ln w="12700" cap="flat" cmpd="sng" algn="ctr">
+          <a:solidFill>
+            <a:schemeClr val="phClr"/>
+          </a:solidFill>
+          <a:prstDash val="solid"/>
+          <a:miter lim="800000"/>
+        </a:ln>
+        <a:ln w="19050" cap="flat" cmpd="sng" algn="ctr">
+          <a:solidFill>
+            <a:schemeClr val="phClr"/>
+          </a:solidFill>
+          <a:prstDash val="solid"/>
+          <a:miter lim="800000"/>
+        </a:ln>
+      </a:lnStyleLst>
+      <a:effectStyleLst>
+        <a:effectStyle>
+          <a:effectLst/>
+        </a:effectStyle>
+        <a:effectStyle>
+          <a:effectLst/>
+        </a:effectStyle>
+        <a:effectStyle>
+          <a:effectLst>
+            <a:outerShdw blurRad="57150" dist="19050" dir="5400000" algn="ctr" rotWithShape="0">
+              <a:srgbClr val="000000">
+                <a:alpha val="63000"/>
+              </a:srgbClr>
+            </a:outerShdw>
+          </a:effectLst>
+        </a:effectStyle>
+      </a:effectStyleLst>
+      <a:bgFillStyleLst>
+        <a:solidFill>
+          <a:schemeClr val="phClr"/>
+        </a:solidFill>
+        <a:solidFill>
+          <a:schemeClr val="phClr">
+            <a:tint val="95000"/>
+            <a:satMod val="170000"/>
+          </a:schemeClr>
+        </a:solidFill>
+        <a:gradFill rotWithShape="1">
+          <a:gsLst>
+            <a:gs pos="0">
+              <a:schemeClr val="phClr">
+                <a:tint val="93000"/>
+                <a:satMod val="150000"/>
+                <a:shade val="98000"/>
+                <a:lumMod val="102000"/>
+              </a:schemeClr>
+            </a:gs>
+            <a:gs pos="50000">
+              <a:schemeClr val="phClr">
+                <a:tint val="98000"/>
+                <a:satMod val="130000"/>
+                <a:shade val="90000"/>
+                <a:lumMod val="103000"/>
+              </a:schemeClr>
+            </a:gs>
+            <a:gs pos="100000">
+              <a:schemeClr val="phClr">
+                <a:shade val="63000"/>
+                <a:satMod val="120000"/>
+              </a:schemeClr>
+            </a:gs>
+          </a:gsLst>
+          <a:lin ang="5400000" scaled="0"/>
+        </a:gradFill>
+      </a:bgFillStyleLst>
+    </a:fmtScheme>
+  </a:themeElements>
+  <a:objectDefaults/>
+  <a:extraClrSchemeLst/>
+  <a:extLst>
+    <a:ext uri="{05A4C25C-085E-4340-85A3-A5531E510DB2}">
+      <thm15:themeFamily xmlns:thm15="http://schemas.microsoft.com/office/thememl/2012/main" name="Office Theme" id="{62F939B6-93AF-4DB8-9C6B-D6C7DFDC589F}" vid="{4A3C46E8-61CC-4603-A589-7422A47A8E4A}"/>
+    </a:ext>
+  </a:extLst>
+</a:theme>
 </file>
</xml_diff>